<commit_message>
Actualización de presentación del proyecto
Agregadas diapositivas y animaciones a la sección de "Planificación" (WIP).
</commit_message>
<xml_diff>
--- a/PFentertainment_presentación.pptx
+++ b/PFentertainment_presentación.pptx
@@ -5,10 +5,10 @@
     <p:sldMasterId id="2147484831" r:id="rId1"/>
   </p:sldMasterIdLst>
   <p:notesMasterIdLst>
-    <p:notesMasterId r:id="rId22"/>
+    <p:notesMasterId r:id="rId25"/>
   </p:notesMasterIdLst>
   <p:handoutMasterIdLst>
-    <p:handoutMasterId r:id="rId23"/>
+    <p:handoutMasterId r:id="rId26"/>
   </p:handoutMasterIdLst>
   <p:sldIdLst>
     <p:sldId id="256" r:id="rId2"/>
@@ -18,19 +18,22 @@
     <p:sldId id="266" r:id="rId6"/>
     <p:sldId id="259" r:id="rId7"/>
     <p:sldId id="260" r:id="rId8"/>
-    <p:sldId id="261" r:id="rId9"/>
-    <p:sldId id="264" r:id="rId10"/>
-    <p:sldId id="262" r:id="rId11"/>
-    <p:sldId id="273" r:id="rId12"/>
-    <p:sldId id="276" r:id="rId13"/>
-    <p:sldId id="277" r:id="rId14"/>
-    <p:sldId id="265" r:id="rId15"/>
-    <p:sldId id="272" r:id="rId16"/>
-    <p:sldId id="263" r:id="rId17"/>
-    <p:sldId id="267" r:id="rId18"/>
-    <p:sldId id="268" r:id="rId19"/>
-    <p:sldId id="269" r:id="rId20"/>
-    <p:sldId id="270" r:id="rId21"/>
+    <p:sldId id="278" r:id="rId9"/>
+    <p:sldId id="279" r:id="rId10"/>
+    <p:sldId id="280" r:id="rId11"/>
+    <p:sldId id="261" r:id="rId12"/>
+    <p:sldId id="264" r:id="rId13"/>
+    <p:sldId id="262" r:id="rId14"/>
+    <p:sldId id="273" r:id="rId15"/>
+    <p:sldId id="276" r:id="rId16"/>
+    <p:sldId id="277" r:id="rId17"/>
+    <p:sldId id="265" r:id="rId18"/>
+    <p:sldId id="272" r:id="rId19"/>
+    <p:sldId id="263" r:id="rId20"/>
+    <p:sldId id="267" r:id="rId21"/>
+    <p:sldId id="268" r:id="rId22"/>
+    <p:sldId id="269" r:id="rId23"/>
+    <p:sldId id="270" r:id="rId24"/>
   </p:sldIdLst>
   <p:sldSz cx="9144000" cy="6858000" type="screen4x3"/>
   <p:notesSz cx="6858000" cy="9144000"/>
@@ -251,7 +254,7 @@
             <a:fld id="{0252902A-18E7-6440-A09B-741E2A2B6D42}" type="datetimeFigureOut">
               <a:rPr lang="es-ES" smtClean="0"/>
               <a:pPr/>
-              <a:t>04/06/2022</a:t>
+              <a:t>05/06/2022</a:t>
             </a:fld>
             <a:endParaRPr lang="es-ES"/>
           </a:p>
@@ -419,7 +422,7 @@
             <a:fld id="{4FA7064A-13DB-A34E-B31E-2D0AF10C5A7A}" type="datetimeFigureOut">
               <a:rPr lang="es-ES" smtClean="0"/>
               <a:pPr/>
-              <a:t>04/06/2022</a:t>
+              <a:t>05/06/2022</a:t>
             </a:fld>
             <a:endParaRPr lang="es-ES"/>
           </a:p>
@@ -4214,7 +4217,7 @@
           <p:cNvPr id="2" name="Título 1">
             <a:extLst>
               <a:ext uri="{FF2B5EF4-FFF2-40B4-BE49-F238E27FC236}">
-                <a16:creationId xmlns:a16="http://schemas.microsoft.com/office/drawing/2014/main" id="{F92B5780-49D8-D397-78A8-E07A10F47A4C}"/>
+                <a16:creationId xmlns:a16="http://schemas.microsoft.com/office/drawing/2014/main" id="{04B46495-5D51-55E9-9CB7-C4644155D94A}"/>
               </a:ext>
             </a:extLst>
           </p:cNvPr>
@@ -4231,77 +4234,12 @@
           <a:lstStyle/>
           <a:p>
             <a:r>
-              <a:rPr lang="es-ES" sz="2950">
+              <a:rPr lang="es-ES" sz="3200" dirty="0">
                 <a:latin typeface="Geneva"/>
               </a:rPr>
-              <a:t>Patrones</a:t>
-            </a:r>
-            <a:endParaRPr lang="es-ES"/>
-          </a:p>
-        </p:txBody>
-      </p:sp>
-      <p:sp>
-        <p:nvSpPr>
-          <p:cNvPr id="3" name="Marcador de contenido 2">
-            <a:extLst>
-              <a:ext uri="{FF2B5EF4-FFF2-40B4-BE49-F238E27FC236}">
-                <a16:creationId xmlns:a16="http://schemas.microsoft.com/office/drawing/2014/main" id="{2FDC2392-65CF-CBD0-FD19-E260ABAC49CB}"/>
-              </a:ext>
-            </a:extLst>
-          </p:cNvPr>
-          <p:cNvSpPr>
-            <a:spLocks noGrp="1"/>
-          </p:cNvSpPr>
-          <p:nvPr>
-            <p:ph idx="1"/>
-          </p:nvPr>
-        </p:nvSpPr>
-        <p:spPr/>
-        <p:txBody>
-          <a:bodyPr vert="horz" lIns="91440" tIns="45720" rIns="91440" bIns="45720" rtlCol="0" anchor="t">
-            <a:normAutofit/>
-          </a:bodyPr>
-          <a:lstStyle/>
-          <a:p>
-            <a:pPr marL="0" indent="0" algn="ctr">
-              <a:buNone/>
-            </a:pPr>
-            <a:r>
-              <a:rPr lang="es-ES" sz="2950" dirty="0">
-                <a:latin typeface="Helvetica"/>
-                <a:ea typeface="Verdana"/>
-                <a:cs typeface="Arial"/>
-              </a:rPr>
-              <a:t>Patrón </a:t>
-            </a:r>
-            <a:r>
-              <a:rPr lang="es-ES" sz="2950" dirty="0" err="1">
-                <a:latin typeface="Helvetica"/>
-                <a:ea typeface="Verdana"/>
-                <a:cs typeface="Arial"/>
-              </a:rPr>
-              <a:t>Façade</a:t>
-            </a:r>
-            <a:r>
-              <a:rPr lang="es-ES" sz="2950" dirty="0">
-                <a:latin typeface="Helvetica"/>
-                <a:ea typeface="Verdana"/>
-                <a:cs typeface="Arial"/>
-              </a:rPr>
-              <a:t>: la clase Partida hace de fachada, pues el usuario interactúa con ella y ella comienza a crear objetos de las otras clases.</a:t>
-            </a:r>
-          </a:p>
-          <a:p>
-            <a:pPr marL="0" indent="0" algn="ctr">
-              <a:buNone/>
-            </a:pPr>
-            <a:endParaRPr lang="es-ES" sz="2950"/>
-          </a:p>
-          <a:p>
-            <a:pPr marL="0" indent="0" algn="ctr">
-              <a:buNone/>
-            </a:pPr>
-            <a:endParaRPr lang="es-ES" sz="2950" dirty="0"/>
+              <a:t>Planificación</a:t>
+            </a:r>
+            <a:endParaRPr lang="es-ES" dirty="0"/>
           </a:p>
         </p:txBody>
       </p:sp>
@@ -4310,7 +4248,7 @@
           <p:cNvPr id="4" name="Marcador de fecha 3">
             <a:extLst>
               <a:ext uri="{FF2B5EF4-FFF2-40B4-BE49-F238E27FC236}">
-                <a16:creationId xmlns:a16="http://schemas.microsoft.com/office/drawing/2014/main" id="{0779FFCC-B079-4DB2-AD00-99192F4D993C}"/>
+                <a16:creationId xmlns:a16="http://schemas.microsoft.com/office/drawing/2014/main" id="{0252129A-4E51-5805-B99F-B201D3B9383B}"/>
               </a:ext>
             </a:extLst>
           </p:cNvPr>
@@ -4347,7 +4285,7 @@
           <p:cNvPr id="5" name="Marcador de pie de página 4">
             <a:extLst>
               <a:ext uri="{FF2B5EF4-FFF2-40B4-BE49-F238E27FC236}">
-                <a16:creationId xmlns:a16="http://schemas.microsoft.com/office/drawing/2014/main" id="{A8170F22-D978-887A-A622-BB7A4BDD8F8B}"/>
+                <a16:creationId xmlns:a16="http://schemas.microsoft.com/office/drawing/2014/main" id="{E4E507FF-6B3D-F737-181A-732E19EBBBF0}"/>
               </a:ext>
             </a:extLst>
           </p:cNvPr>
@@ -4384,7 +4322,7 @@
           <p:cNvPr id="6" name="Marcador de número de diapositiva 5">
             <a:extLst>
               <a:ext uri="{FF2B5EF4-FFF2-40B4-BE49-F238E27FC236}">
-                <a16:creationId xmlns:a16="http://schemas.microsoft.com/office/drawing/2014/main" id="{3A425E5B-FF22-FD9C-5BE3-4E38594D88B1}"/>
+                <a16:creationId xmlns:a16="http://schemas.microsoft.com/office/drawing/2014/main" id="{3E579B45-4B84-1610-6651-413F2B9603FA}"/>
               </a:ext>
             </a:extLst>
           </p:cNvPr>
@@ -4415,6 +4353,1357 @@
                 <a:defRPr/>
               </a:pPr>
               <a:t>10</a:t>
+            </a:fld>
+            <a:endParaRPr lang="es-ES">
+              <a:solidFill>
+                <a:prstClr val="black">
+                  <a:tint val="75000"/>
+                </a:prstClr>
+              </a:solidFill>
+            </a:endParaRPr>
+          </a:p>
+        </p:txBody>
+      </p:sp>
+      <p:sp>
+        <p:nvSpPr>
+          <p:cNvPr id="12" name="Marcador de contenido 2">
+            <a:extLst>
+              <a:ext uri="{FF2B5EF4-FFF2-40B4-BE49-F238E27FC236}">
+                <a16:creationId xmlns:a16="http://schemas.microsoft.com/office/drawing/2014/main" id="{29ABE0C3-1CD9-EEE2-F075-7F695520B0AE}"/>
+              </a:ext>
+            </a:extLst>
+          </p:cNvPr>
+          <p:cNvSpPr txBox="1">
+            <a:spLocks/>
+          </p:cNvSpPr>
+          <p:nvPr/>
+        </p:nvSpPr>
+        <p:spPr>
+          <a:xfrm>
+            <a:off x="628649" y="1449351"/>
+            <a:ext cx="7886700" cy="1194302"/>
+          </a:xfrm>
+          <a:prstGeom prst="rect">
+            <a:avLst/>
+          </a:prstGeom>
+        </p:spPr>
+        <p:txBody>
+          <a:bodyPr vert="horz" lIns="91440" tIns="45720" rIns="91440" bIns="45720" rtlCol="0">
+            <a:normAutofit/>
+          </a:bodyPr>
+          <a:lstStyle>
+            <a:lvl1pPr marL="211021" indent="-211021" algn="l" defTabSz="844083" rtl="0" eaLnBrk="1" latinLnBrk="0" hangingPunct="1">
+              <a:lnSpc>
+                <a:spcPct val="100000"/>
+              </a:lnSpc>
+              <a:spcBef>
+                <a:spcPts val="554"/>
+              </a:spcBef>
+              <a:spcAft>
+                <a:spcPts val="554"/>
+              </a:spcAft>
+              <a:buFont typeface="Arial" panose="020B0604020202020204" pitchFamily="34" charset="0"/>
+              <a:buChar char="•"/>
+              <a:defRPr sz="2954" kern="1200">
+                <a:solidFill>
+                  <a:schemeClr val="tx1"/>
+                </a:solidFill>
+                <a:latin typeface="Helvetica" pitchFamily="2" charset="0"/>
+                <a:ea typeface="Verdana" panose="020B0604030504040204" pitchFamily="34" charset="0"/>
+                <a:cs typeface="Arial" panose="020B0604020202020204" pitchFamily="34" charset="0"/>
+              </a:defRPr>
+            </a:lvl1pPr>
+            <a:lvl2pPr marL="633062" indent="-211021" algn="l" defTabSz="844083" rtl="0" eaLnBrk="1" latinLnBrk="0" hangingPunct="1">
+              <a:lnSpc>
+                <a:spcPct val="100000"/>
+              </a:lnSpc>
+              <a:spcBef>
+                <a:spcPts val="554"/>
+              </a:spcBef>
+              <a:spcAft>
+                <a:spcPts val="554"/>
+              </a:spcAft>
+              <a:buFont typeface="Arial" panose="020B0604020202020204" pitchFamily="34" charset="0"/>
+              <a:buChar char="•"/>
+              <a:defRPr sz="2585" kern="1200">
+                <a:solidFill>
+                  <a:schemeClr val="tx1"/>
+                </a:solidFill>
+                <a:latin typeface="Helvetica" pitchFamily="2" charset="0"/>
+                <a:ea typeface="Verdana" panose="020B0604030504040204" pitchFamily="34" charset="0"/>
+                <a:cs typeface="Arial" panose="020B0604020202020204" pitchFamily="34" charset="0"/>
+              </a:defRPr>
+            </a:lvl2pPr>
+            <a:lvl3pPr marL="1055103" indent="-211021" algn="l" defTabSz="844083" rtl="0" eaLnBrk="1" latinLnBrk="0" hangingPunct="1">
+              <a:lnSpc>
+                <a:spcPct val="100000"/>
+              </a:lnSpc>
+              <a:spcBef>
+                <a:spcPts val="554"/>
+              </a:spcBef>
+              <a:spcAft>
+                <a:spcPts val="554"/>
+              </a:spcAft>
+              <a:buFont typeface="Arial" panose="020B0604020202020204" pitchFamily="34" charset="0"/>
+              <a:buChar char="•"/>
+              <a:defRPr sz="2215" kern="1200">
+                <a:solidFill>
+                  <a:schemeClr val="tx1"/>
+                </a:solidFill>
+                <a:latin typeface="Helvetica" pitchFamily="2" charset="0"/>
+                <a:ea typeface="Verdana" panose="020B0604030504040204" pitchFamily="34" charset="0"/>
+                <a:cs typeface="Arial" panose="020B0604020202020204" pitchFamily="34" charset="0"/>
+              </a:defRPr>
+            </a:lvl3pPr>
+            <a:lvl4pPr marL="1477145" indent="-211021" algn="l" defTabSz="844083" rtl="0" eaLnBrk="1" latinLnBrk="0" hangingPunct="1">
+              <a:lnSpc>
+                <a:spcPct val="100000"/>
+              </a:lnSpc>
+              <a:spcBef>
+                <a:spcPts val="554"/>
+              </a:spcBef>
+              <a:spcAft>
+                <a:spcPts val="554"/>
+              </a:spcAft>
+              <a:buFont typeface="Arial" panose="020B0604020202020204" pitchFamily="34" charset="0"/>
+              <a:buChar char="•"/>
+              <a:defRPr sz="1846" kern="1200">
+                <a:solidFill>
+                  <a:schemeClr val="tx1"/>
+                </a:solidFill>
+                <a:latin typeface="Helvetica" pitchFamily="2" charset="0"/>
+                <a:ea typeface="Verdana" panose="020B0604030504040204" pitchFamily="34" charset="0"/>
+                <a:cs typeface="Arial" panose="020B0604020202020204" pitchFamily="34" charset="0"/>
+              </a:defRPr>
+            </a:lvl4pPr>
+            <a:lvl5pPr marL="1899186" indent="-211021" algn="l" defTabSz="844083" rtl="0" eaLnBrk="1" latinLnBrk="0" hangingPunct="1">
+              <a:lnSpc>
+                <a:spcPct val="100000"/>
+              </a:lnSpc>
+              <a:spcBef>
+                <a:spcPts val="554"/>
+              </a:spcBef>
+              <a:spcAft>
+                <a:spcPts val="554"/>
+              </a:spcAft>
+              <a:buFont typeface="Arial" panose="020B0604020202020204" pitchFamily="34" charset="0"/>
+              <a:buChar char="•"/>
+              <a:defRPr sz="1846" kern="1200">
+                <a:solidFill>
+                  <a:schemeClr val="tx1"/>
+                </a:solidFill>
+                <a:latin typeface="Helvetica" pitchFamily="2" charset="0"/>
+                <a:ea typeface="Verdana" panose="020B0604030504040204" pitchFamily="34" charset="0"/>
+                <a:cs typeface="Arial" panose="020B0604020202020204" pitchFamily="34" charset="0"/>
+              </a:defRPr>
+            </a:lvl5pPr>
+            <a:lvl6pPr marL="2321227" indent="-211021" algn="l" defTabSz="844083" rtl="0" eaLnBrk="1" latinLnBrk="0" hangingPunct="1">
+              <a:lnSpc>
+                <a:spcPct val="90000"/>
+              </a:lnSpc>
+              <a:spcBef>
+                <a:spcPts val="462"/>
+              </a:spcBef>
+              <a:buFont typeface="Arial" panose="020B0604020202020204" pitchFamily="34" charset="0"/>
+              <a:buChar char="•"/>
+              <a:defRPr sz="1662" kern="1200">
+                <a:solidFill>
+                  <a:schemeClr val="tx1"/>
+                </a:solidFill>
+                <a:latin typeface="+mn-lt"/>
+                <a:ea typeface="+mn-ea"/>
+                <a:cs typeface="+mn-cs"/>
+              </a:defRPr>
+            </a:lvl6pPr>
+            <a:lvl7pPr marL="2743269" indent="-211021" algn="l" defTabSz="844083" rtl="0" eaLnBrk="1" latinLnBrk="0" hangingPunct="1">
+              <a:lnSpc>
+                <a:spcPct val="90000"/>
+              </a:lnSpc>
+              <a:spcBef>
+                <a:spcPts val="462"/>
+              </a:spcBef>
+              <a:buFont typeface="Arial" panose="020B0604020202020204" pitchFamily="34" charset="0"/>
+              <a:buChar char="•"/>
+              <a:defRPr sz="1662" kern="1200">
+                <a:solidFill>
+                  <a:schemeClr val="tx1"/>
+                </a:solidFill>
+                <a:latin typeface="+mn-lt"/>
+                <a:ea typeface="+mn-ea"/>
+                <a:cs typeface="+mn-cs"/>
+              </a:defRPr>
+            </a:lvl7pPr>
+            <a:lvl8pPr marL="3165310" indent="-211021" algn="l" defTabSz="844083" rtl="0" eaLnBrk="1" latinLnBrk="0" hangingPunct="1">
+              <a:lnSpc>
+                <a:spcPct val="90000"/>
+              </a:lnSpc>
+              <a:spcBef>
+                <a:spcPts val="462"/>
+              </a:spcBef>
+              <a:buFont typeface="Arial" panose="020B0604020202020204" pitchFamily="34" charset="0"/>
+              <a:buChar char="•"/>
+              <a:defRPr sz="1662" kern="1200">
+                <a:solidFill>
+                  <a:schemeClr val="tx1"/>
+                </a:solidFill>
+                <a:latin typeface="+mn-lt"/>
+                <a:ea typeface="+mn-ea"/>
+                <a:cs typeface="+mn-cs"/>
+              </a:defRPr>
+            </a:lvl8pPr>
+            <a:lvl9pPr marL="3587351" indent="-211021" algn="l" defTabSz="844083" rtl="0" eaLnBrk="1" latinLnBrk="0" hangingPunct="1">
+              <a:lnSpc>
+                <a:spcPct val="90000"/>
+              </a:lnSpc>
+              <a:spcBef>
+                <a:spcPts val="462"/>
+              </a:spcBef>
+              <a:buFont typeface="Arial" panose="020B0604020202020204" pitchFamily="34" charset="0"/>
+              <a:buChar char="•"/>
+              <a:defRPr sz="1662" kern="1200">
+                <a:solidFill>
+                  <a:schemeClr val="tx1"/>
+                </a:solidFill>
+                <a:latin typeface="+mn-lt"/>
+                <a:ea typeface="+mn-ea"/>
+                <a:cs typeface="+mn-cs"/>
+              </a:defRPr>
+            </a:lvl9pPr>
+          </a:lstStyle>
+          <a:p>
+            <a:r>
+              <a:rPr lang="es-ES" dirty="0"/>
+              <a:t>Creación de reglas y botones para agilizar la organización (Butler).</a:t>
+            </a:r>
+          </a:p>
+        </p:txBody>
+      </p:sp>
+      <p:sp>
+        <p:nvSpPr>
+          <p:cNvPr id="10" name="Marcador de contenido 2">
+            <a:extLst>
+              <a:ext uri="{FF2B5EF4-FFF2-40B4-BE49-F238E27FC236}">
+                <a16:creationId xmlns:a16="http://schemas.microsoft.com/office/drawing/2014/main" id="{AF356377-1392-942B-9A1E-98EE5342A5EC}"/>
+              </a:ext>
+            </a:extLst>
+          </p:cNvPr>
+          <p:cNvSpPr txBox="1">
+            <a:spLocks/>
+          </p:cNvSpPr>
+          <p:nvPr/>
+        </p:nvSpPr>
+        <p:spPr>
+          <a:xfrm>
+            <a:off x="628649" y="2440983"/>
+            <a:ext cx="7886700" cy="1194302"/>
+          </a:xfrm>
+          <a:prstGeom prst="rect">
+            <a:avLst/>
+          </a:prstGeom>
+        </p:spPr>
+        <p:txBody>
+          <a:bodyPr vert="horz" lIns="91440" tIns="45720" rIns="91440" bIns="45720" rtlCol="0">
+            <a:normAutofit/>
+          </a:bodyPr>
+          <a:lstStyle>
+            <a:lvl1pPr marL="211021" indent="-211021" algn="l" defTabSz="844083" rtl="0" eaLnBrk="1" latinLnBrk="0" hangingPunct="1">
+              <a:lnSpc>
+                <a:spcPct val="100000"/>
+              </a:lnSpc>
+              <a:spcBef>
+                <a:spcPts val="554"/>
+              </a:spcBef>
+              <a:spcAft>
+                <a:spcPts val="554"/>
+              </a:spcAft>
+              <a:buFont typeface="Arial" panose="020B0604020202020204" pitchFamily="34" charset="0"/>
+              <a:buChar char="•"/>
+              <a:defRPr sz="2954" kern="1200">
+                <a:solidFill>
+                  <a:schemeClr val="tx1"/>
+                </a:solidFill>
+                <a:latin typeface="Helvetica" pitchFamily="2" charset="0"/>
+                <a:ea typeface="Verdana" panose="020B0604030504040204" pitchFamily="34" charset="0"/>
+                <a:cs typeface="Arial" panose="020B0604020202020204" pitchFamily="34" charset="0"/>
+              </a:defRPr>
+            </a:lvl1pPr>
+            <a:lvl2pPr marL="633062" indent="-211021" algn="l" defTabSz="844083" rtl="0" eaLnBrk="1" latinLnBrk="0" hangingPunct="1">
+              <a:lnSpc>
+                <a:spcPct val="100000"/>
+              </a:lnSpc>
+              <a:spcBef>
+                <a:spcPts val="554"/>
+              </a:spcBef>
+              <a:spcAft>
+                <a:spcPts val="554"/>
+              </a:spcAft>
+              <a:buFont typeface="Arial" panose="020B0604020202020204" pitchFamily="34" charset="0"/>
+              <a:buChar char="•"/>
+              <a:defRPr sz="2585" kern="1200">
+                <a:solidFill>
+                  <a:schemeClr val="tx1"/>
+                </a:solidFill>
+                <a:latin typeface="Helvetica" pitchFamily="2" charset="0"/>
+                <a:ea typeface="Verdana" panose="020B0604030504040204" pitchFamily="34" charset="0"/>
+                <a:cs typeface="Arial" panose="020B0604020202020204" pitchFamily="34" charset="0"/>
+              </a:defRPr>
+            </a:lvl2pPr>
+            <a:lvl3pPr marL="1055103" indent="-211021" algn="l" defTabSz="844083" rtl="0" eaLnBrk="1" latinLnBrk="0" hangingPunct="1">
+              <a:lnSpc>
+                <a:spcPct val="100000"/>
+              </a:lnSpc>
+              <a:spcBef>
+                <a:spcPts val="554"/>
+              </a:spcBef>
+              <a:spcAft>
+                <a:spcPts val="554"/>
+              </a:spcAft>
+              <a:buFont typeface="Arial" panose="020B0604020202020204" pitchFamily="34" charset="0"/>
+              <a:buChar char="•"/>
+              <a:defRPr sz="2215" kern="1200">
+                <a:solidFill>
+                  <a:schemeClr val="tx1"/>
+                </a:solidFill>
+                <a:latin typeface="Helvetica" pitchFamily="2" charset="0"/>
+                <a:ea typeface="Verdana" panose="020B0604030504040204" pitchFamily="34" charset="0"/>
+                <a:cs typeface="Arial" panose="020B0604020202020204" pitchFamily="34" charset="0"/>
+              </a:defRPr>
+            </a:lvl3pPr>
+            <a:lvl4pPr marL="1477145" indent="-211021" algn="l" defTabSz="844083" rtl="0" eaLnBrk="1" latinLnBrk="0" hangingPunct="1">
+              <a:lnSpc>
+                <a:spcPct val="100000"/>
+              </a:lnSpc>
+              <a:spcBef>
+                <a:spcPts val="554"/>
+              </a:spcBef>
+              <a:spcAft>
+                <a:spcPts val="554"/>
+              </a:spcAft>
+              <a:buFont typeface="Arial" panose="020B0604020202020204" pitchFamily="34" charset="0"/>
+              <a:buChar char="•"/>
+              <a:defRPr sz="1846" kern="1200">
+                <a:solidFill>
+                  <a:schemeClr val="tx1"/>
+                </a:solidFill>
+                <a:latin typeface="Helvetica" pitchFamily="2" charset="0"/>
+                <a:ea typeface="Verdana" panose="020B0604030504040204" pitchFamily="34" charset="0"/>
+                <a:cs typeface="Arial" panose="020B0604020202020204" pitchFamily="34" charset="0"/>
+              </a:defRPr>
+            </a:lvl4pPr>
+            <a:lvl5pPr marL="1899186" indent="-211021" algn="l" defTabSz="844083" rtl="0" eaLnBrk="1" latinLnBrk="0" hangingPunct="1">
+              <a:lnSpc>
+                <a:spcPct val="100000"/>
+              </a:lnSpc>
+              <a:spcBef>
+                <a:spcPts val="554"/>
+              </a:spcBef>
+              <a:spcAft>
+                <a:spcPts val="554"/>
+              </a:spcAft>
+              <a:buFont typeface="Arial" panose="020B0604020202020204" pitchFamily="34" charset="0"/>
+              <a:buChar char="•"/>
+              <a:defRPr sz="1846" kern="1200">
+                <a:solidFill>
+                  <a:schemeClr val="tx1"/>
+                </a:solidFill>
+                <a:latin typeface="Helvetica" pitchFamily="2" charset="0"/>
+                <a:ea typeface="Verdana" panose="020B0604030504040204" pitchFamily="34" charset="0"/>
+                <a:cs typeface="Arial" panose="020B0604020202020204" pitchFamily="34" charset="0"/>
+              </a:defRPr>
+            </a:lvl5pPr>
+            <a:lvl6pPr marL="2321227" indent="-211021" algn="l" defTabSz="844083" rtl="0" eaLnBrk="1" latinLnBrk="0" hangingPunct="1">
+              <a:lnSpc>
+                <a:spcPct val="90000"/>
+              </a:lnSpc>
+              <a:spcBef>
+                <a:spcPts val="462"/>
+              </a:spcBef>
+              <a:buFont typeface="Arial" panose="020B0604020202020204" pitchFamily="34" charset="0"/>
+              <a:buChar char="•"/>
+              <a:defRPr sz="1662" kern="1200">
+                <a:solidFill>
+                  <a:schemeClr val="tx1"/>
+                </a:solidFill>
+                <a:latin typeface="+mn-lt"/>
+                <a:ea typeface="+mn-ea"/>
+                <a:cs typeface="+mn-cs"/>
+              </a:defRPr>
+            </a:lvl6pPr>
+            <a:lvl7pPr marL="2743269" indent="-211021" algn="l" defTabSz="844083" rtl="0" eaLnBrk="1" latinLnBrk="0" hangingPunct="1">
+              <a:lnSpc>
+                <a:spcPct val="90000"/>
+              </a:lnSpc>
+              <a:spcBef>
+                <a:spcPts val="462"/>
+              </a:spcBef>
+              <a:buFont typeface="Arial" panose="020B0604020202020204" pitchFamily="34" charset="0"/>
+              <a:buChar char="•"/>
+              <a:defRPr sz="1662" kern="1200">
+                <a:solidFill>
+                  <a:schemeClr val="tx1"/>
+                </a:solidFill>
+                <a:latin typeface="+mn-lt"/>
+                <a:ea typeface="+mn-ea"/>
+                <a:cs typeface="+mn-cs"/>
+              </a:defRPr>
+            </a:lvl7pPr>
+            <a:lvl8pPr marL="3165310" indent="-211021" algn="l" defTabSz="844083" rtl="0" eaLnBrk="1" latinLnBrk="0" hangingPunct="1">
+              <a:lnSpc>
+                <a:spcPct val="90000"/>
+              </a:lnSpc>
+              <a:spcBef>
+                <a:spcPts val="462"/>
+              </a:spcBef>
+              <a:buFont typeface="Arial" panose="020B0604020202020204" pitchFamily="34" charset="0"/>
+              <a:buChar char="•"/>
+              <a:defRPr sz="1662" kern="1200">
+                <a:solidFill>
+                  <a:schemeClr val="tx1"/>
+                </a:solidFill>
+                <a:latin typeface="+mn-lt"/>
+                <a:ea typeface="+mn-ea"/>
+                <a:cs typeface="+mn-cs"/>
+              </a:defRPr>
+            </a:lvl8pPr>
+            <a:lvl9pPr marL="3587351" indent="-211021" algn="l" defTabSz="844083" rtl="0" eaLnBrk="1" latinLnBrk="0" hangingPunct="1">
+              <a:lnSpc>
+                <a:spcPct val="90000"/>
+              </a:lnSpc>
+              <a:spcBef>
+                <a:spcPts val="462"/>
+              </a:spcBef>
+              <a:buFont typeface="Arial" panose="020B0604020202020204" pitchFamily="34" charset="0"/>
+              <a:buChar char="•"/>
+              <a:defRPr sz="1662" kern="1200">
+                <a:solidFill>
+                  <a:schemeClr val="tx1"/>
+                </a:solidFill>
+                <a:latin typeface="+mn-lt"/>
+                <a:ea typeface="+mn-ea"/>
+                <a:cs typeface="+mn-cs"/>
+              </a:defRPr>
+            </a:lvl9pPr>
+          </a:lstStyle>
+          <a:p>
+            <a:r>
+              <a:rPr lang="es-ES" dirty="0" err="1"/>
+              <a:t>Review</a:t>
+            </a:r>
+            <a:r>
+              <a:rPr lang="es-ES" dirty="0"/>
+              <a:t> &amp; </a:t>
+            </a:r>
+            <a:r>
+              <a:rPr lang="es-ES" dirty="0" err="1"/>
+              <a:t>Feedback</a:t>
+            </a:r>
+            <a:r>
+              <a:rPr lang="es-ES" dirty="0"/>
+              <a:t> a través de </a:t>
+            </a:r>
+            <a:r>
+              <a:rPr lang="es-ES" i="1" dirty="0" err="1"/>
+              <a:t>issues</a:t>
+            </a:r>
+            <a:r>
+              <a:rPr lang="es-ES" dirty="0"/>
+              <a:t> en GitHub, y </a:t>
+            </a:r>
+            <a:r>
+              <a:rPr lang="es-ES" dirty="0" err="1"/>
+              <a:t>Discord</a:t>
+            </a:r>
+            <a:r>
+              <a:rPr lang="es-ES" dirty="0"/>
+              <a:t>.</a:t>
+            </a:r>
+          </a:p>
+        </p:txBody>
+      </p:sp>
+      <p:pic>
+        <p:nvPicPr>
+          <p:cNvPr id="14" name="Imagen 13">
+            <a:extLst>
+              <a:ext uri="{FF2B5EF4-FFF2-40B4-BE49-F238E27FC236}">
+                <a16:creationId xmlns:a16="http://schemas.microsoft.com/office/drawing/2014/main" id="{0CFFFF52-B8F5-D11A-A4A1-346F4C7D9CE6}"/>
+              </a:ext>
+            </a:extLst>
+          </p:cNvPr>
+          <p:cNvPicPr>
+            <a:picLocks noChangeAspect="1"/>
+          </p:cNvPicPr>
+          <p:nvPr/>
+        </p:nvPicPr>
+        <p:blipFill>
+          <a:blip r:embed="rId2"/>
+          <a:stretch>
+            <a:fillRect/>
+          </a:stretch>
+        </p:blipFill>
+        <p:spPr>
+          <a:xfrm>
+            <a:off x="896167" y="3799258"/>
+            <a:ext cx="4657562" cy="2513442"/>
+          </a:xfrm>
+          <a:prstGeom prst="rect">
+            <a:avLst/>
+          </a:prstGeom>
+          <a:ln>
+            <a:solidFill>
+              <a:schemeClr val="accent2"/>
+            </a:solidFill>
+          </a:ln>
+        </p:spPr>
+      </p:pic>
+      <p:pic>
+        <p:nvPicPr>
+          <p:cNvPr id="18" name="Imagen 17">
+            <a:extLst>
+              <a:ext uri="{FF2B5EF4-FFF2-40B4-BE49-F238E27FC236}">
+                <a16:creationId xmlns:a16="http://schemas.microsoft.com/office/drawing/2014/main" id="{B142CF12-EB92-F853-7355-F070B3D8898B}"/>
+              </a:ext>
+            </a:extLst>
+          </p:cNvPr>
+          <p:cNvPicPr>
+            <a:picLocks noChangeAspect="1"/>
+          </p:cNvPicPr>
+          <p:nvPr/>
+        </p:nvPicPr>
+        <p:blipFill>
+          <a:blip r:embed="rId3"/>
+          <a:stretch>
+            <a:fillRect/>
+          </a:stretch>
+        </p:blipFill>
+        <p:spPr>
+          <a:xfrm>
+            <a:off x="3430045" y="3429000"/>
+            <a:ext cx="4880207" cy="1063999"/>
+          </a:xfrm>
+          <a:prstGeom prst="rect">
+            <a:avLst/>
+          </a:prstGeom>
+          <a:ln>
+            <a:solidFill>
+              <a:schemeClr val="accent2"/>
+            </a:solidFill>
+          </a:ln>
+        </p:spPr>
+      </p:pic>
+    </p:spTree>
+    <p:extLst>
+      <p:ext uri="{BB962C8B-B14F-4D97-AF65-F5344CB8AC3E}">
+        <p14:creationId xmlns:p14="http://schemas.microsoft.com/office/powerpoint/2010/main" val="3901915659"/>
+      </p:ext>
+    </p:extLst>
+  </p:cSld>
+  <p:clrMapOvr>
+    <a:masterClrMapping/>
+  </p:clrMapOvr>
+  <mc:AlternateContent xmlns:mc="http://schemas.openxmlformats.org/markup-compatibility/2006">
+    <mc:Choice xmlns:p159="http://schemas.microsoft.com/office/powerpoint/2015/09/main" Requires="p159">
+      <p:transition spd="slow">
+        <p159:morph option="byObject"/>
+      </p:transition>
+    </mc:Choice>
+    <mc:Fallback>
+      <p:transition spd="slow">
+        <p:fade/>
+      </p:transition>
+    </mc:Fallback>
+  </mc:AlternateContent>
+</p:sld>
+</file>
+
+<file path=ppt/slides/slide11.xml><?xml version="1.0" encoding="utf-8"?>
+<p:sld xmlns:a="http://schemas.openxmlformats.org/drawingml/2006/main" xmlns:r="http://schemas.openxmlformats.org/officeDocument/2006/relationships" xmlns:p="http://schemas.openxmlformats.org/presentationml/2006/main">
+  <p:cSld>
+    <p:spTree>
+      <p:nvGrpSpPr>
+        <p:cNvPr id="1" name=""/>
+        <p:cNvGrpSpPr/>
+        <p:nvPr/>
+      </p:nvGrpSpPr>
+      <p:grpSpPr>
+        <a:xfrm>
+          <a:off x="0" y="0"/>
+          <a:ext cx="0" cy="0"/>
+          <a:chOff x="0" y="0"/>
+          <a:chExt cx="0" cy="0"/>
+        </a:xfrm>
+      </p:grpSpPr>
+      <p:sp>
+        <p:nvSpPr>
+          <p:cNvPr id="2" name="Título 1">
+            <a:extLst>
+              <a:ext uri="{FF2B5EF4-FFF2-40B4-BE49-F238E27FC236}">
+                <a16:creationId xmlns:a16="http://schemas.microsoft.com/office/drawing/2014/main" id="{F69FF439-ADBC-E2A8-75DD-26B866C6235E}"/>
+              </a:ext>
+            </a:extLst>
+          </p:cNvPr>
+          <p:cNvSpPr>
+            <a:spLocks noGrp="1"/>
+          </p:cNvSpPr>
+          <p:nvPr>
+            <p:ph type="title"/>
+          </p:nvPr>
+        </p:nvSpPr>
+        <p:spPr/>
+        <p:txBody>
+          <a:bodyPr/>
+          <a:lstStyle/>
+          <a:p>
+            <a:r>
+              <a:rPr lang="es-ES" sz="2950">
+                <a:latin typeface="Geneva"/>
+              </a:rPr>
+              <a:t>Arquitectura</a:t>
+            </a:r>
+            <a:endParaRPr lang="es-ES"/>
+          </a:p>
+        </p:txBody>
+      </p:sp>
+      <p:pic>
+        <p:nvPicPr>
+          <p:cNvPr id="7" name="Imagen 7" descr="Diagrama&#10;&#10;Descripción generada automáticamente">
+            <a:extLst>
+              <a:ext uri="{FF2B5EF4-FFF2-40B4-BE49-F238E27FC236}">
+                <a16:creationId xmlns:a16="http://schemas.microsoft.com/office/drawing/2014/main" id="{045DC57D-CB8C-4C99-0826-520B1A229B32}"/>
+              </a:ext>
+            </a:extLst>
+          </p:cNvPr>
+          <p:cNvPicPr>
+            <a:picLocks noGrp="1" noChangeAspect="1"/>
+          </p:cNvPicPr>
+          <p:nvPr>
+            <p:ph idx="1"/>
+          </p:nvPr>
+        </p:nvPicPr>
+        <p:blipFill>
+          <a:blip r:embed="rId2"/>
+          <a:stretch>
+            <a:fillRect/>
+          </a:stretch>
+        </p:blipFill>
+        <p:spPr>
+          <a:xfrm>
+            <a:off x="1069017" y="1739654"/>
+            <a:ext cx="7389300" cy="4153842"/>
+          </a:xfrm>
+        </p:spPr>
+      </p:pic>
+      <p:sp>
+        <p:nvSpPr>
+          <p:cNvPr id="4" name="Marcador de fecha 3">
+            <a:extLst>
+              <a:ext uri="{FF2B5EF4-FFF2-40B4-BE49-F238E27FC236}">
+                <a16:creationId xmlns:a16="http://schemas.microsoft.com/office/drawing/2014/main" id="{1C7F6A76-A49E-63E1-873B-974ABA7D96CF}"/>
+              </a:ext>
+            </a:extLst>
+          </p:cNvPr>
+          <p:cNvSpPr>
+            <a:spLocks noGrp="1"/>
+          </p:cNvSpPr>
+          <p:nvPr>
+            <p:ph type="dt" sz="half" idx="10"/>
+          </p:nvPr>
+        </p:nvSpPr>
+        <p:spPr/>
+        <p:txBody>
+          <a:bodyPr/>
+          <a:lstStyle/>
+          <a:p>
+            <a:pPr defTabSz="422041">
+              <a:defRPr/>
+            </a:pPr>
+            <a:r>
+              <a:rPr lang="es-ES">
+                <a:solidFill>
+                  <a:prstClr val="black">
+                    <a:tint val="75000"/>
+                  </a:prstClr>
+                </a:solidFill>
+              </a:rPr>
+              <a:t>Curso 2021-2022</a:t>
+            </a:r>
+          </a:p>
+        </p:txBody>
+      </p:sp>
+      <p:sp>
+        <p:nvSpPr>
+          <p:cNvPr id="5" name="Marcador de pie de página 4">
+            <a:extLst>
+              <a:ext uri="{FF2B5EF4-FFF2-40B4-BE49-F238E27FC236}">
+                <a16:creationId xmlns:a16="http://schemas.microsoft.com/office/drawing/2014/main" id="{B02D4C27-4DF3-360E-6F59-85946C50BBE2}"/>
+              </a:ext>
+            </a:extLst>
+          </p:cNvPr>
+          <p:cNvSpPr>
+            <a:spLocks noGrp="1"/>
+          </p:cNvSpPr>
+          <p:nvPr>
+            <p:ph type="ftr" sz="quarter" idx="11"/>
+          </p:nvPr>
+        </p:nvSpPr>
+        <p:spPr/>
+        <p:txBody>
+          <a:bodyPr/>
+          <a:lstStyle/>
+          <a:p>
+            <a:pPr defTabSz="422041">
+              <a:defRPr/>
+            </a:pPr>
+            <a:r>
+              <a:rPr lang="es-ES">
+                <a:solidFill>
+                  <a:prstClr val="black">
+                    <a:tint val="75000"/>
+                  </a:prstClr>
+                </a:solidFill>
+              </a:rPr>
+              <a:t>Introducción a la Ingeniería del Software</a:t>
+            </a:r>
+          </a:p>
+        </p:txBody>
+      </p:sp>
+      <p:sp>
+        <p:nvSpPr>
+          <p:cNvPr id="6" name="Marcador de número de diapositiva 5">
+            <a:extLst>
+              <a:ext uri="{FF2B5EF4-FFF2-40B4-BE49-F238E27FC236}">
+                <a16:creationId xmlns:a16="http://schemas.microsoft.com/office/drawing/2014/main" id="{F4FB0E14-3B76-E561-001A-F81574E95A75}"/>
+              </a:ext>
+            </a:extLst>
+          </p:cNvPr>
+          <p:cNvSpPr>
+            <a:spLocks noGrp="1"/>
+          </p:cNvSpPr>
+          <p:nvPr>
+            <p:ph type="sldNum" sz="quarter" idx="12"/>
+          </p:nvPr>
+        </p:nvSpPr>
+        <p:spPr/>
+        <p:txBody>
+          <a:bodyPr/>
+          <a:lstStyle/>
+          <a:p>
+            <a:pPr defTabSz="422041">
+              <a:defRPr/>
+            </a:pPr>
+            <a:fld id="{9961DA19-05BC-2C48-AEE7-B9DFD6D07410}" type="slidenum">
+              <a:rPr lang="es-ES" smtClean="0">
+                <a:solidFill>
+                  <a:prstClr val="black">
+                    <a:tint val="75000"/>
+                  </a:prstClr>
+                </a:solidFill>
+              </a:rPr>
+              <a:pPr defTabSz="422041">
+                <a:defRPr/>
+              </a:pPr>
+              <a:t>11</a:t>
+            </a:fld>
+            <a:endParaRPr lang="es-ES">
+              <a:solidFill>
+                <a:prstClr val="black">
+                  <a:tint val="75000"/>
+                </a:prstClr>
+              </a:solidFill>
+            </a:endParaRPr>
+          </a:p>
+        </p:txBody>
+      </p:sp>
+      <p:sp>
+        <p:nvSpPr>
+          <p:cNvPr id="8" name="CuadroTexto 7">
+            <a:extLst>
+              <a:ext uri="{FF2B5EF4-FFF2-40B4-BE49-F238E27FC236}">
+                <a16:creationId xmlns:a16="http://schemas.microsoft.com/office/drawing/2014/main" id="{869C0773-BC34-3837-9693-47BDA2D12B51}"/>
+              </a:ext>
+            </a:extLst>
+          </p:cNvPr>
+          <p:cNvSpPr txBox="1"/>
+          <p:nvPr/>
+        </p:nvSpPr>
+        <p:spPr>
+          <a:xfrm>
+            <a:off x="1904650" y="1304179"/>
+            <a:ext cx="5598065" cy="523220"/>
+          </a:xfrm>
+          <a:prstGeom prst="rect">
+            <a:avLst/>
+          </a:prstGeom>
+          <a:noFill/>
+        </p:spPr>
+        <p:txBody>
+          <a:bodyPr rot="0" spcFirstLastPara="0" vertOverflow="overflow" horzOverflow="overflow" vert="horz" wrap="square" lIns="91440" tIns="45720" rIns="91440" bIns="45720" numCol="1" spcCol="0" rtlCol="0" fromWordArt="0" anchor="t" anchorCtr="0" forceAA="0" compatLnSpc="1">
+            <a:prstTxWarp prst="textNoShape">
+              <a:avLst/>
+            </a:prstTxWarp>
+            <a:spAutoFit/>
+          </a:bodyPr>
+          <a:lstStyle/>
+          <a:p>
+            <a:pPr algn="ctr"/>
+            <a:r>
+              <a:rPr lang="es-ES" sz="2800" b="1">
+                <a:solidFill>
+                  <a:schemeClr val="accent1">
+                    <a:lumMod val="50000"/>
+                  </a:schemeClr>
+                </a:solidFill>
+                <a:cs typeface="Calibri"/>
+              </a:rPr>
+              <a:t>MVC: Modelo-vista-controlador</a:t>
+            </a:r>
+          </a:p>
+        </p:txBody>
+      </p:sp>
+      <p:sp>
+        <p:nvSpPr>
+          <p:cNvPr id="3" name="CuadroTexto 2">
+            <a:extLst>
+              <a:ext uri="{FF2B5EF4-FFF2-40B4-BE49-F238E27FC236}">
+                <a16:creationId xmlns:a16="http://schemas.microsoft.com/office/drawing/2014/main" id="{4A28829C-2C89-6F0A-E605-F90A985885EA}"/>
+              </a:ext>
+            </a:extLst>
+          </p:cNvPr>
+          <p:cNvSpPr txBox="1"/>
+          <p:nvPr/>
+        </p:nvSpPr>
+        <p:spPr>
+          <a:xfrm>
+            <a:off x="469725" y="5845348"/>
+            <a:ext cx="1590807" cy="375595"/>
+          </a:xfrm>
+          <a:prstGeom prst="rect">
+            <a:avLst/>
+          </a:prstGeom>
+          <a:noFill/>
+        </p:spPr>
+        <p:txBody>
+          <a:bodyPr wrap="square" rtlCol="0">
+            <a:spAutoFit/>
+          </a:bodyPr>
+          <a:lstStyle/>
+          <a:p>
+            <a:r>
+              <a:rPr lang="es-ES" dirty="0">
+                <a:hlinkClick r:id="rId3"/>
+              </a:rPr>
+              <a:t>AUTÓMATA</a:t>
+            </a:r>
+            <a:r>
+              <a:rPr lang="es-ES" dirty="0"/>
+              <a:t> </a:t>
+            </a:r>
+          </a:p>
+        </p:txBody>
+      </p:sp>
+    </p:spTree>
+    <p:extLst>
+      <p:ext uri="{BB962C8B-B14F-4D97-AF65-F5344CB8AC3E}">
+        <p14:creationId xmlns:p14="http://schemas.microsoft.com/office/powerpoint/2010/main" val="3636806485"/>
+      </p:ext>
+    </p:extLst>
+  </p:cSld>
+  <p:clrMapOvr>
+    <a:masterClrMapping/>
+  </p:clrMapOvr>
+  <p:transition spd="med">
+    <p:pull/>
+  </p:transition>
+</p:sld>
+</file>
+
+<file path=ppt/slides/slide12.xml><?xml version="1.0" encoding="utf-8"?>
+<p:sld xmlns:a="http://schemas.openxmlformats.org/drawingml/2006/main" xmlns:r="http://schemas.openxmlformats.org/officeDocument/2006/relationships" xmlns:p="http://schemas.openxmlformats.org/presentationml/2006/main">
+  <p:cSld>
+    <p:spTree>
+      <p:nvGrpSpPr>
+        <p:cNvPr id="1" name=""/>
+        <p:cNvGrpSpPr/>
+        <p:nvPr/>
+      </p:nvGrpSpPr>
+      <p:grpSpPr>
+        <a:xfrm>
+          <a:off x="0" y="0"/>
+          <a:ext cx="0" cy="0"/>
+          <a:chOff x="0" y="0"/>
+          <a:chExt cx="0" cy="0"/>
+        </a:xfrm>
+      </p:grpSpPr>
+      <p:sp>
+        <p:nvSpPr>
+          <p:cNvPr id="2" name="Título 1">
+            <a:extLst>
+              <a:ext uri="{FF2B5EF4-FFF2-40B4-BE49-F238E27FC236}">
+                <a16:creationId xmlns:a16="http://schemas.microsoft.com/office/drawing/2014/main" id="{06B4040A-B532-101C-06D2-E433575FEA12}"/>
+              </a:ext>
+            </a:extLst>
+          </p:cNvPr>
+          <p:cNvSpPr>
+            <a:spLocks noGrp="1"/>
+          </p:cNvSpPr>
+          <p:nvPr>
+            <p:ph type="title"/>
+          </p:nvPr>
+        </p:nvSpPr>
+        <p:spPr/>
+        <p:txBody>
+          <a:bodyPr/>
+          <a:lstStyle/>
+          <a:p>
+            <a:r>
+              <a:rPr lang="es-ES" sz="2950">
+                <a:latin typeface="Geneva"/>
+              </a:rPr>
+              <a:t>Modelos</a:t>
+            </a:r>
+            <a:endParaRPr lang="es-ES" sz="2950"/>
+          </a:p>
+        </p:txBody>
+      </p:sp>
+      <p:sp>
+        <p:nvSpPr>
+          <p:cNvPr id="3" name="Marcador de contenido 2">
+            <a:extLst>
+              <a:ext uri="{FF2B5EF4-FFF2-40B4-BE49-F238E27FC236}">
+                <a16:creationId xmlns:a16="http://schemas.microsoft.com/office/drawing/2014/main" id="{249AF41E-3847-E031-C574-A321E770A3C4}"/>
+              </a:ext>
+            </a:extLst>
+          </p:cNvPr>
+          <p:cNvSpPr>
+            <a:spLocks noGrp="1"/>
+          </p:cNvSpPr>
+          <p:nvPr>
+            <p:ph idx="1"/>
+          </p:nvPr>
+        </p:nvSpPr>
+        <p:spPr>
+          <a:xfrm>
+            <a:off x="660255" y="1430205"/>
+            <a:ext cx="7897234" cy="4730600"/>
+          </a:xfrm>
+        </p:spPr>
+        <p:txBody>
+          <a:bodyPr vert="horz" lIns="91440" tIns="45720" rIns="91440" bIns="45720" rtlCol="0" anchor="t">
+            <a:noAutofit/>
+          </a:bodyPr>
+          <a:lstStyle/>
+          <a:p>
+            <a:pPr marL="0" indent="0" algn="ctr">
+              <a:buNone/>
+            </a:pPr>
+            <a:endParaRPr lang="es-ES" sz="3600"/>
+          </a:p>
+        </p:txBody>
+      </p:sp>
+      <p:sp>
+        <p:nvSpPr>
+          <p:cNvPr id="4" name="Marcador de fecha 3">
+            <a:extLst>
+              <a:ext uri="{FF2B5EF4-FFF2-40B4-BE49-F238E27FC236}">
+                <a16:creationId xmlns:a16="http://schemas.microsoft.com/office/drawing/2014/main" id="{1CE2F660-9A10-8F85-498A-F308016B7DEA}"/>
+              </a:ext>
+            </a:extLst>
+          </p:cNvPr>
+          <p:cNvSpPr>
+            <a:spLocks noGrp="1"/>
+          </p:cNvSpPr>
+          <p:nvPr>
+            <p:ph type="dt" sz="half" idx="10"/>
+          </p:nvPr>
+        </p:nvSpPr>
+        <p:spPr/>
+        <p:txBody>
+          <a:bodyPr/>
+          <a:lstStyle/>
+          <a:p>
+            <a:pPr defTabSz="422041">
+              <a:defRPr/>
+            </a:pPr>
+            <a:r>
+              <a:rPr lang="es-ES">
+                <a:solidFill>
+                  <a:prstClr val="black">
+                    <a:tint val="75000"/>
+                  </a:prstClr>
+                </a:solidFill>
+              </a:rPr>
+              <a:t>Curso 2021-2022</a:t>
+            </a:r>
+          </a:p>
+        </p:txBody>
+      </p:sp>
+      <p:sp>
+        <p:nvSpPr>
+          <p:cNvPr id="5" name="Marcador de pie de página 4">
+            <a:extLst>
+              <a:ext uri="{FF2B5EF4-FFF2-40B4-BE49-F238E27FC236}">
+                <a16:creationId xmlns:a16="http://schemas.microsoft.com/office/drawing/2014/main" id="{5EADE792-0AFB-5272-59A1-C260F22570E8}"/>
+              </a:ext>
+            </a:extLst>
+          </p:cNvPr>
+          <p:cNvSpPr>
+            <a:spLocks noGrp="1"/>
+          </p:cNvSpPr>
+          <p:nvPr>
+            <p:ph type="ftr" sz="quarter" idx="11"/>
+          </p:nvPr>
+        </p:nvSpPr>
+        <p:spPr/>
+        <p:txBody>
+          <a:bodyPr/>
+          <a:lstStyle/>
+          <a:p>
+            <a:pPr defTabSz="422041">
+              <a:defRPr/>
+            </a:pPr>
+            <a:r>
+              <a:rPr lang="es-ES">
+                <a:solidFill>
+                  <a:prstClr val="black">
+                    <a:tint val="75000"/>
+                  </a:prstClr>
+                </a:solidFill>
+              </a:rPr>
+              <a:t>Introducción a la Ingeniería del Software</a:t>
+            </a:r>
+          </a:p>
+        </p:txBody>
+      </p:sp>
+      <p:sp>
+        <p:nvSpPr>
+          <p:cNvPr id="6" name="Marcador de número de diapositiva 5">
+            <a:extLst>
+              <a:ext uri="{FF2B5EF4-FFF2-40B4-BE49-F238E27FC236}">
+                <a16:creationId xmlns:a16="http://schemas.microsoft.com/office/drawing/2014/main" id="{ACEAFB86-E3DC-0881-5E73-F8C28677AED0}"/>
+              </a:ext>
+            </a:extLst>
+          </p:cNvPr>
+          <p:cNvSpPr>
+            <a:spLocks noGrp="1"/>
+          </p:cNvSpPr>
+          <p:nvPr>
+            <p:ph type="sldNum" sz="quarter" idx="12"/>
+          </p:nvPr>
+        </p:nvSpPr>
+        <p:spPr/>
+        <p:txBody>
+          <a:bodyPr/>
+          <a:lstStyle/>
+          <a:p>
+            <a:pPr defTabSz="422041">
+              <a:defRPr/>
+            </a:pPr>
+            <a:fld id="{9961DA19-05BC-2C48-AEE7-B9DFD6D07410}" type="slidenum">
+              <a:rPr lang="es-ES" smtClean="0">
+                <a:solidFill>
+                  <a:prstClr val="black">
+                    <a:tint val="75000"/>
+                  </a:prstClr>
+                </a:solidFill>
+              </a:rPr>
+              <a:pPr defTabSz="422041">
+                <a:defRPr/>
+              </a:pPr>
+              <a:t>12</a:t>
+            </a:fld>
+            <a:endParaRPr lang="es-ES">
+              <a:solidFill>
+                <a:prstClr val="black">
+                  <a:tint val="75000"/>
+                </a:prstClr>
+              </a:solidFill>
+            </a:endParaRPr>
+          </a:p>
+        </p:txBody>
+      </p:sp>
+      <p:pic>
+        <p:nvPicPr>
+          <p:cNvPr id="10" name="Imagen 9">
+            <a:extLst>
+              <a:ext uri="{FF2B5EF4-FFF2-40B4-BE49-F238E27FC236}">
+                <a16:creationId xmlns:a16="http://schemas.microsoft.com/office/drawing/2014/main" id="{E78671A5-C72E-D736-8F93-0AB072E93C20}"/>
+              </a:ext>
+            </a:extLst>
+          </p:cNvPr>
+          <p:cNvPicPr>
+            <a:picLocks noChangeAspect="1"/>
+          </p:cNvPicPr>
+          <p:nvPr/>
+        </p:nvPicPr>
+        <p:blipFill>
+          <a:blip r:embed="rId2" cstate="email">
+            <a:extLst>
+              <a:ext uri="{28A0092B-C50C-407E-A947-70E740481C1C}">
+                <a14:useLocalDpi xmlns:a14="http://schemas.microsoft.com/office/drawing/2010/main" val="0"/>
+              </a:ext>
+            </a:extLst>
+          </a:blip>
+          <a:stretch>
+            <a:fillRect/>
+          </a:stretch>
+        </p:blipFill>
+        <p:spPr>
+          <a:xfrm>
+            <a:off x="173935" y="1349345"/>
+            <a:ext cx="8796130" cy="5090893"/>
+          </a:xfrm>
+          <a:prstGeom prst="rect">
+            <a:avLst/>
+          </a:prstGeom>
+        </p:spPr>
+      </p:pic>
+    </p:spTree>
+    <p:extLst>
+      <p:ext uri="{BB962C8B-B14F-4D97-AF65-F5344CB8AC3E}">
+        <p14:creationId xmlns:p14="http://schemas.microsoft.com/office/powerpoint/2010/main" val="3841751223"/>
+      </p:ext>
+    </p:extLst>
+  </p:cSld>
+  <p:clrMapOvr>
+    <a:masterClrMapping/>
+  </p:clrMapOvr>
+  <mc:AlternateContent xmlns:mc="http://schemas.openxmlformats.org/markup-compatibility/2006" xmlns:p14="http://schemas.microsoft.com/office/powerpoint/2010/main">
+    <mc:Choice Requires="p14">
+      <p:transition spd="slow" p14:dur="800">
+        <p:circle/>
+      </p:transition>
+    </mc:Choice>
+    <mc:Fallback xmlns="">
+      <p:transition spd="slow">
+        <p:circle/>
+      </p:transition>
+    </mc:Fallback>
+  </mc:AlternateContent>
+</p:sld>
+</file>
+
+<file path=ppt/slides/slide13.xml><?xml version="1.0" encoding="utf-8"?>
+<p:sld xmlns:a="http://schemas.openxmlformats.org/drawingml/2006/main" xmlns:r="http://schemas.openxmlformats.org/officeDocument/2006/relationships" xmlns:p="http://schemas.openxmlformats.org/presentationml/2006/main">
+  <p:cSld>
+    <p:spTree>
+      <p:nvGrpSpPr>
+        <p:cNvPr id="1" name=""/>
+        <p:cNvGrpSpPr/>
+        <p:nvPr/>
+      </p:nvGrpSpPr>
+      <p:grpSpPr>
+        <a:xfrm>
+          <a:off x="0" y="0"/>
+          <a:ext cx="0" cy="0"/>
+          <a:chOff x="0" y="0"/>
+          <a:chExt cx="0" cy="0"/>
+        </a:xfrm>
+      </p:grpSpPr>
+      <p:sp>
+        <p:nvSpPr>
+          <p:cNvPr id="2" name="Título 1">
+            <a:extLst>
+              <a:ext uri="{FF2B5EF4-FFF2-40B4-BE49-F238E27FC236}">
+                <a16:creationId xmlns:a16="http://schemas.microsoft.com/office/drawing/2014/main" id="{F92B5780-49D8-D397-78A8-E07A10F47A4C}"/>
+              </a:ext>
+            </a:extLst>
+          </p:cNvPr>
+          <p:cNvSpPr>
+            <a:spLocks noGrp="1"/>
+          </p:cNvSpPr>
+          <p:nvPr>
+            <p:ph type="title"/>
+          </p:nvPr>
+        </p:nvSpPr>
+        <p:spPr/>
+        <p:txBody>
+          <a:bodyPr/>
+          <a:lstStyle/>
+          <a:p>
+            <a:r>
+              <a:rPr lang="es-ES" sz="2950">
+                <a:latin typeface="Geneva"/>
+              </a:rPr>
+              <a:t>Patrones</a:t>
+            </a:r>
+            <a:endParaRPr lang="es-ES"/>
+          </a:p>
+        </p:txBody>
+      </p:sp>
+      <p:sp>
+        <p:nvSpPr>
+          <p:cNvPr id="3" name="Marcador de contenido 2">
+            <a:extLst>
+              <a:ext uri="{FF2B5EF4-FFF2-40B4-BE49-F238E27FC236}">
+                <a16:creationId xmlns:a16="http://schemas.microsoft.com/office/drawing/2014/main" id="{2FDC2392-65CF-CBD0-FD19-E260ABAC49CB}"/>
+              </a:ext>
+            </a:extLst>
+          </p:cNvPr>
+          <p:cNvSpPr>
+            <a:spLocks noGrp="1"/>
+          </p:cNvSpPr>
+          <p:nvPr>
+            <p:ph idx="1"/>
+          </p:nvPr>
+        </p:nvSpPr>
+        <p:spPr/>
+        <p:txBody>
+          <a:bodyPr vert="horz" lIns="91440" tIns="45720" rIns="91440" bIns="45720" rtlCol="0" anchor="t">
+            <a:normAutofit/>
+          </a:bodyPr>
+          <a:lstStyle/>
+          <a:p>
+            <a:pPr marL="0" indent="0" algn="ctr">
+              <a:buNone/>
+            </a:pPr>
+            <a:r>
+              <a:rPr lang="es-ES" sz="2950" dirty="0">
+                <a:latin typeface="Helvetica"/>
+                <a:ea typeface="Verdana"/>
+                <a:cs typeface="Arial"/>
+              </a:rPr>
+              <a:t>Patrón </a:t>
+            </a:r>
+            <a:r>
+              <a:rPr lang="es-ES" sz="2950" dirty="0" err="1">
+                <a:latin typeface="Helvetica"/>
+                <a:ea typeface="Verdana"/>
+                <a:cs typeface="Arial"/>
+              </a:rPr>
+              <a:t>Façade</a:t>
+            </a:r>
+            <a:r>
+              <a:rPr lang="es-ES" sz="2950" dirty="0">
+                <a:latin typeface="Helvetica"/>
+                <a:ea typeface="Verdana"/>
+                <a:cs typeface="Arial"/>
+              </a:rPr>
+              <a:t>: la clase Partida hace de fachada, pues el usuario interactúa con ella y ella comienza a crear objetos de las otras clases.</a:t>
+            </a:r>
+          </a:p>
+          <a:p>
+            <a:pPr marL="0" indent="0" algn="ctr">
+              <a:buNone/>
+            </a:pPr>
+            <a:endParaRPr lang="es-ES" sz="2950"/>
+          </a:p>
+          <a:p>
+            <a:pPr marL="0" indent="0" algn="ctr">
+              <a:buNone/>
+            </a:pPr>
+            <a:endParaRPr lang="es-ES" sz="2950" dirty="0"/>
+          </a:p>
+        </p:txBody>
+      </p:sp>
+      <p:sp>
+        <p:nvSpPr>
+          <p:cNvPr id="4" name="Marcador de fecha 3">
+            <a:extLst>
+              <a:ext uri="{FF2B5EF4-FFF2-40B4-BE49-F238E27FC236}">
+                <a16:creationId xmlns:a16="http://schemas.microsoft.com/office/drawing/2014/main" id="{0779FFCC-B079-4DB2-AD00-99192F4D993C}"/>
+              </a:ext>
+            </a:extLst>
+          </p:cNvPr>
+          <p:cNvSpPr>
+            <a:spLocks noGrp="1"/>
+          </p:cNvSpPr>
+          <p:nvPr>
+            <p:ph type="dt" sz="half" idx="10"/>
+          </p:nvPr>
+        </p:nvSpPr>
+        <p:spPr/>
+        <p:txBody>
+          <a:bodyPr/>
+          <a:lstStyle/>
+          <a:p>
+            <a:pPr defTabSz="422041">
+              <a:defRPr/>
+            </a:pPr>
+            <a:r>
+              <a:rPr lang="es-ES">
+                <a:solidFill>
+                  <a:prstClr val="black">
+                    <a:tint val="75000"/>
+                  </a:prstClr>
+                </a:solidFill>
+              </a:rPr>
+              <a:t>Curso 2021-2022</a:t>
+            </a:r>
+          </a:p>
+        </p:txBody>
+      </p:sp>
+      <p:sp>
+        <p:nvSpPr>
+          <p:cNvPr id="5" name="Marcador de pie de página 4">
+            <a:extLst>
+              <a:ext uri="{FF2B5EF4-FFF2-40B4-BE49-F238E27FC236}">
+                <a16:creationId xmlns:a16="http://schemas.microsoft.com/office/drawing/2014/main" id="{A8170F22-D978-887A-A622-BB7A4BDD8F8B}"/>
+              </a:ext>
+            </a:extLst>
+          </p:cNvPr>
+          <p:cNvSpPr>
+            <a:spLocks noGrp="1"/>
+          </p:cNvSpPr>
+          <p:nvPr>
+            <p:ph type="ftr" sz="quarter" idx="11"/>
+          </p:nvPr>
+        </p:nvSpPr>
+        <p:spPr/>
+        <p:txBody>
+          <a:bodyPr/>
+          <a:lstStyle/>
+          <a:p>
+            <a:pPr defTabSz="422041">
+              <a:defRPr/>
+            </a:pPr>
+            <a:r>
+              <a:rPr lang="es-ES">
+                <a:solidFill>
+                  <a:prstClr val="black">
+                    <a:tint val="75000"/>
+                  </a:prstClr>
+                </a:solidFill>
+              </a:rPr>
+              <a:t>Introducción a la Ingeniería del Software</a:t>
+            </a:r>
+          </a:p>
+        </p:txBody>
+      </p:sp>
+      <p:sp>
+        <p:nvSpPr>
+          <p:cNvPr id="6" name="Marcador de número de diapositiva 5">
+            <a:extLst>
+              <a:ext uri="{FF2B5EF4-FFF2-40B4-BE49-F238E27FC236}">
+                <a16:creationId xmlns:a16="http://schemas.microsoft.com/office/drawing/2014/main" id="{3A425E5B-FF22-FD9C-5BE3-4E38594D88B1}"/>
+              </a:ext>
+            </a:extLst>
+          </p:cNvPr>
+          <p:cNvSpPr>
+            <a:spLocks noGrp="1"/>
+          </p:cNvSpPr>
+          <p:nvPr>
+            <p:ph type="sldNum" sz="quarter" idx="12"/>
+          </p:nvPr>
+        </p:nvSpPr>
+        <p:spPr/>
+        <p:txBody>
+          <a:bodyPr/>
+          <a:lstStyle/>
+          <a:p>
+            <a:pPr defTabSz="422041">
+              <a:defRPr/>
+            </a:pPr>
+            <a:fld id="{9961DA19-05BC-2C48-AEE7-B9DFD6D07410}" type="slidenum">
+              <a:rPr lang="es-ES" smtClean="0">
+                <a:solidFill>
+                  <a:prstClr val="black">
+                    <a:tint val="75000"/>
+                  </a:prstClr>
+                </a:solidFill>
+              </a:rPr>
+              <a:pPr defTabSz="422041">
+                <a:defRPr/>
+              </a:pPr>
+              <a:t>13</a:t>
             </a:fld>
             <a:endParaRPr lang="es-ES">
               <a:solidFill>
@@ -4678,7 +5967,7 @@
 </p:sld>
 </file>
 
-<file path=ppt/slides/slide11.xml><?xml version="1.0" encoding="utf-8"?>
+<file path=ppt/slides/slide14.xml><?xml version="1.0" encoding="utf-8"?>
 <p:sld xmlns:a="http://schemas.openxmlformats.org/drawingml/2006/main" xmlns:r="http://schemas.openxmlformats.org/officeDocument/2006/relationships" xmlns:p="http://schemas.openxmlformats.org/presentationml/2006/main">
   <p:cSld>
     <p:spTree>
@@ -4897,7 +6186,7 @@
               <a:pPr defTabSz="422041">
                 <a:defRPr/>
               </a:pPr>
-              <a:t>11</a:t>
+              <a:t>14</a:t>
             </a:fld>
             <a:endParaRPr lang="es-ES">
               <a:solidFill>
@@ -5000,7 +6289,7 @@
 </p:sld>
 </file>
 
-<file path=ppt/slides/slide12.xml><?xml version="1.0" encoding="utf-8"?>
+<file path=ppt/slides/slide15.xml><?xml version="1.0" encoding="utf-8"?>
 <p:sld xmlns:a="http://schemas.openxmlformats.org/drawingml/2006/main" xmlns:r="http://schemas.openxmlformats.org/officeDocument/2006/relationships" xmlns:p="http://schemas.openxmlformats.org/presentationml/2006/main">
   <p:cSld>
     <p:spTree>
@@ -5229,7 +6518,7 @@
               <a:pPr defTabSz="422041">
                 <a:defRPr/>
               </a:pPr>
-              <a:t>12</a:t>
+              <a:t>15</a:t>
             </a:fld>
             <a:endParaRPr lang="es-ES">
               <a:solidFill>
@@ -5330,7 +6619,7 @@
 </p:sld>
 </file>
 
-<file path=ppt/slides/slide13.xml><?xml version="1.0" encoding="utf-8"?>
+<file path=ppt/slides/slide16.xml><?xml version="1.0" encoding="utf-8"?>
 <p:sld xmlns:a="http://schemas.openxmlformats.org/drawingml/2006/main" xmlns:r="http://schemas.openxmlformats.org/officeDocument/2006/relationships" xmlns:p="http://schemas.openxmlformats.org/presentationml/2006/main">
   <p:cSld>
     <p:spTree>
@@ -5543,7 +6832,7 @@
               <a:pPr defTabSz="422041">
                 <a:defRPr/>
               </a:pPr>
-              <a:t>13</a:t>
+              <a:t>16</a:t>
             </a:fld>
             <a:endParaRPr lang="es-ES">
               <a:solidFill>
@@ -5879,7 +7168,7 @@
 </p:sld>
 </file>
 
-<file path=ppt/slides/slide14.xml><?xml version="1.0" encoding="utf-8"?>
+<file path=ppt/slides/slide17.xml><?xml version="1.0" encoding="utf-8"?>
 <p:sld xmlns:a="http://schemas.openxmlformats.org/drawingml/2006/main" xmlns:r="http://schemas.openxmlformats.org/officeDocument/2006/relationships" xmlns:p="http://schemas.openxmlformats.org/presentationml/2006/main">
   <p:cSld>
     <p:spTree>
@@ -5999,7 +7288,7 @@
               <a:pPr defTabSz="422041">
                 <a:defRPr/>
               </a:pPr>
-              <a:t>14</a:t>
+              <a:t>17</a:t>
             </a:fld>
             <a:endParaRPr lang="es-ES">
               <a:solidFill>
@@ -6135,7 +7424,7 @@
 </p:sld>
 </file>
 
-<file path=ppt/slides/slide15.xml><?xml version="1.0" encoding="utf-8"?>
+<file path=ppt/slides/slide18.xml><?xml version="1.0" encoding="utf-8"?>
 <p:sld xmlns:a="http://schemas.openxmlformats.org/drawingml/2006/main" xmlns:r="http://schemas.openxmlformats.org/officeDocument/2006/relationships" xmlns:p="http://schemas.openxmlformats.org/presentationml/2006/main">
   <p:cSld>
     <p:spTree>
@@ -6294,7 +7583,7 @@
               <a:pPr defTabSz="422041">
                 <a:defRPr/>
               </a:pPr>
-              <a:t>15</a:t>
+              <a:t>18</a:t>
             </a:fld>
             <a:endParaRPr lang="es-ES">
               <a:solidFill>
@@ -6394,7 +7683,7 @@
 </p:sld>
 </file>
 
-<file path=ppt/slides/slide16.xml><?xml version="1.0" encoding="utf-8"?>
+<file path=ppt/slides/slide19.xml><?xml version="1.0" encoding="utf-8"?>
 <p:sld xmlns:a="http://schemas.openxmlformats.org/drawingml/2006/main" xmlns:r="http://schemas.openxmlformats.org/officeDocument/2006/relationships" xmlns:p="http://schemas.openxmlformats.org/presentationml/2006/main">
   <p:cSld>
     <p:spTree>
@@ -6580,7 +7869,7 @@
               <a:pPr defTabSz="422041">
                 <a:defRPr/>
               </a:pPr>
-              <a:t>16</a:t>
+              <a:t>19</a:t>
             </a:fld>
             <a:endParaRPr lang="es-ES">
               <a:solidFill>
@@ -6797,7 +8086,7 @@
 </p:sld>
 </file>
 
-<file path=ppt/slides/slide17.xml><?xml version="1.0" encoding="utf-8"?>
+<file path=ppt/slides/slide2.xml><?xml version="1.0" encoding="utf-8"?>
 <p:sld xmlns:a="http://schemas.openxmlformats.org/drawingml/2006/main" xmlns:r="http://schemas.openxmlformats.org/officeDocument/2006/relationships" xmlns:p="http://schemas.openxmlformats.org/presentationml/2006/main">
   <p:cSld>
     <p:spTree>
@@ -6816,6 +8105,264 @@
       </p:grpSpPr>
       <p:sp>
         <p:nvSpPr>
+          <p:cNvPr id="2" name="Título 1"/>
+          <p:cNvSpPr>
+            <a:spLocks noGrp="1"/>
+          </p:cNvSpPr>
+          <p:nvPr>
+            <p:ph type="title"/>
+          </p:nvPr>
+        </p:nvSpPr>
+        <p:spPr/>
+        <p:txBody>
+          <a:bodyPr/>
+          <a:lstStyle/>
+          <a:p>
+            <a:r>
+              <a:rPr lang="es-ES"/>
+              <a:t>Índice de contenidos</a:t>
+            </a:r>
+          </a:p>
+        </p:txBody>
+      </p:sp>
+      <p:sp>
+        <p:nvSpPr>
+          <p:cNvPr id="3" name="Marcador de contenido 2"/>
+          <p:cNvSpPr>
+            <a:spLocks noGrp="1"/>
+          </p:cNvSpPr>
+          <p:nvPr>
+            <p:ph idx="1"/>
+          </p:nvPr>
+        </p:nvSpPr>
+        <p:spPr>
+          <a:xfrm>
+            <a:off x="628650" y="1117600"/>
+            <a:ext cx="8177022" cy="5511800"/>
+          </a:xfrm>
+        </p:spPr>
+        <p:txBody>
+          <a:bodyPr>
+            <a:normAutofit fontScale="55000" lnSpcReduction="20000"/>
+          </a:bodyPr>
+          <a:lstStyle/>
+          <a:p>
+            <a:r>
+              <a:rPr lang="es-ES"/>
+              <a:t>Introducción – El problema</a:t>
+            </a:r>
+          </a:p>
+          <a:p>
+            <a:r>
+              <a:rPr lang="es-ES"/>
+              <a:t>La solución</a:t>
+            </a:r>
+          </a:p>
+          <a:p>
+            <a:r>
+              <a:rPr lang="es-ES"/>
+              <a:t>El equipo y el trabajo en equipo</a:t>
+            </a:r>
+          </a:p>
+          <a:p>
+            <a:r>
+              <a:rPr lang="es-ES"/>
+              <a:t>Actividades de Ingeniería de Software</a:t>
+            </a:r>
+          </a:p>
+          <a:p>
+            <a:pPr lvl="1"/>
+            <a:r>
+              <a:rPr lang="es-ES"/>
+              <a:t>Requisitos</a:t>
+            </a:r>
+          </a:p>
+          <a:p>
+            <a:pPr lvl="1"/>
+            <a:r>
+              <a:rPr lang="es-ES"/>
+              <a:t>Planificación</a:t>
+            </a:r>
+          </a:p>
+          <a:p>
+            <a:pPr lvl="1"/>
+            <a:r>
+              <a:rPr lang="es-ES"/>
+              <a:t>Arquitectura</a:t>
+            </a:r>
+          </a:p>
+          <a:p>
+            <a:pPr lvl="1"/>
+            <a:r>
+              <a:rPr lang="es-ES"/>
+              <a:t>Modelos </a:t>
+            </a:r>
+          </a:p>
+          <a:p>
+            <a:pPr lvl="1"/>
+            <a:r>
+              <a:rPr lang="es-ES"/>
+              <a:t>Patrones/Principios</a:t>
+            </a:r>
+          </a:p>
+          <a:p>
+            <a:pPr lvl="1"/>
+            <a:r>
+              <a:rPr lang="es-ES"/>
+              <a:t>Pruebas</a:t>
+            </a:r>
+          </a:p>
+          <a:p>
+            <a:r>
+              <a:rPr lang="es-ES"/>
+              <a:t>Desarrollo/Despliegue</a:t>
+            </a:r>
+          </a:p>
+          <a:p>
+            <a:pPr lvl="1"/>
+            <a:r>
+              <a:rPr lang="es-ES"/>
+              <a:t>Estrategias y herramientas</a:t>
+            </a:r>
+          </a:p>
+          <a:p>
+            <a:pPr lvl="1"/>
+            <a:r>
+              <a:rPr lang="es-ES"/>
+              <a:t>Modelo de Implementación </a:t>
+            </a:r>
+          </a:p>
+          <a:p>
+            <a:pPr lvl="1"/>
+            <a:r>
+              <a:rPr lang="es-ES"/>
+              <a:t>Despliegue</a:t>
+            </a:r>
+          </a:p>
+          <a:p>
+            <a:r>
+              <a:rPr lang="es-ES"/>
+              <a:t>Resultados</a:t>
+            </a:r>
+          </a:p>
+          <a:p>
+            <a:r>
+              <a:rPr lang="es-ES"/>
+              <a:t>Conclusiones</a:t>
+            </a:r>
+          </a:p>
+        </p:txBody>
+      </p:sp>
+      <p:sp>
+        <p:nvSpPr>
+          <p:cNvPr id="6" name="Marcador de fecha 5">
+            <a:extLst>
+              <a:ext uri="{FF2B5EF4-FFF2-40B4-BE49-F238E27FC236}">
+                <a16:creationId xmlns:a16="http://schemas.microsoft.com/office/drawing/2014/main" id="{F46DF278-D0DC-4016-8CE5-ED318BE19903}"/>
+              </a:ext>
+            </a:extLst>
+          </p:cNvPr>
+          <p:cNvSpPr>
+            <a:spLocks noGrp="1"/>
+          </p:cNvSpPr>
+          <p:nvPr>
+            <p:ph type="dt" sz="half" idx="10"/>
+          </p:nvPr>
+        </p:nvSpPr>
+        <p:spPr/>
+        <p:txBody>
+          <a:bodyPr/>
+          <a:lstStyle/>
+          <a:p>
+            <a:r>
+              <a:rPr lang="es-ES"/>
+              <a:t>Curso 2021-2022</a:t>
+            </a:r>
+            <a:endParaRPr lang="en-US"/>
+          </a:p>
+        </p:txBody>
+      </p:sp>
+      <p:sp>
+        <p:nvSpPr>
+          <p:cNvPr id="4" name="Marcador de pie de página 3"/>
+          <p:cNvSpPr>
+            <a:spLocks noGrp="1"/>
+          </p:cNvSpPr>
+          <p:nvPr>
+            <p:ph type="ftr" sz="quarter" idx="11"/>
+          </p:nvPr>
+        </p:nvSpPr>
+        <p:spPr/>
+        <p:txBody>
+          <a:bodyPr/>
+          <a:lstStyle/>
+          <a:p>
+            <a:r>
+              <a:rPr lang="en-US"/>
+              <a:t>Introducción a la Ingeniería del Software</a:t>
+            </a:r>
+          </a:p>
+        </p:txBody>
+      </p:sp>
+      <p:sp>
+        <p:nvSpPr>
+          <p:cNvPr id="5" name="Marcador de número de diapositiva 4"/>
+          <p:cNvSpPr>
+            <a:spLocks noGrp="1"/>
+          </p:cNvSpPr>
+          <p:nvPr>
+            <p:ph type="sldNum" sz="quarter" idx="12"/>
+          </p:nvPr>
+        </p:nvSpPr>
+        <p:spPr/>
+        <p:txBody>
+          <a:bodyPr/>
+          <a:lstStyle/>
+          <a:p>
+            <a:fld id="{2754ED01-E2A0-4C1E-8E21-014B99041579}" type="slidenum">
+              <a:rPr lang="en-US" smtClean="0"/>
+              <a:pPr/>
+              <a:t>2</a:t>
+            </a:fld>
+            <a:endParaRPr lang="en-US"/>
+          </a:p>
+        </p:txBody>
+      </p:sp>
+    </p:spTree>
+    <p:extLst>
+      <p:ext uri="{BB962C8B-B14F-4D97-AF65-F5344CB8AC3E}">
+        <p14:creationId xmlns:p14="http://schemas.microsoft.com/office/powerpoint/2010/main" val="3365594736"/>
+      </p:ext>
+    </p:extLst>
+  </p:cSld>
+  <p:clrMapOvr>
+    <a:masterClrMapping/>
+  </p:clrMapOvr>
+  <p:transition spd="slow">
+    <p:push dir="u"/>
+  </p:transition>
+</p:sld>
+</file>
+
+<file path=ppt/slides/slide20.xml><?xml version="1.0" encoding="utf-8"?>
+<p:sld xmlns:a="http://schemas.openxmlformats.org/drawingml/2006/main" xmlns:r="http://schemas.openxmlformats.org/officeDocument/2006/relationships" xmlns:p="http://schemas.openxmlformats.org/presentationml/2006/main">
+  <p:cSld>
+    <p:spTree>
+      <p:nvGrpSpPr>
+        <p:cNvPr id="1" name=""/>
+        <p:cNvGrpSpPr/>
+        <p:nvPr/>
+      </p:nvGrpSpPr>
+      <p:grpSpPr>
+        <a:xfrm>
+          <a:off x="0" y="0"/>
+          <a:ext cx="0" cy="0"/>
+          <a:chOff x="0" y="0"/>
+          <a:chExt cx="0" cy="0"/>
+        </a:xfrm>
+      </p:grpSpPr>
+      <p:sp>
+        <p:nvSpPr>
           <p:cNvPr id="2" name="Título 1">
             <a:extLst>
               <a:ext uri="{FF2B5EF4-FFF2-40B4-BE49-F238E27FC236}">
@@ -6954,7 +8501,7 @@
               <a:pPr defTabSz="422041">
                 <a:defRPr/>
               </a:pPr>
-              <a:t>17</a:t>
+              <a:t>20</a:t>
             </a:fld>
             <a:endParaRPr lang="es-ES">
               <a:solidFill>
@@ -7354,7 +8901,7 @@
 </p:sld>
 </file>
 
-<file path=ppt/slides/slide18.xml><?xml version="1.0" encoding="utf-8"?>
+<file path=ppt/slides/slide21.xml><?xml version="1.0" encoding="utf-8"?>
 <p:sld xmlns:a="http://schemas.openxmlformats.org/drawingml/2006/main" xmlns:r="http://schemas.openxmlformats.org/officeDocument/2006/relationships" xmlns:p="http://schemas.openxmlformats.org/presentationml/2006/main">
   <p:cSld>
     <p:spTree>
@@ -7516,7 +9063,7 @@
               <a:pPr defTabSz="422041">
                 <a:defRPr/>
               </a:pPr>
-              <a:t>18</a:t>
+              <a:t>21</a:t>
             </a:fld>
             <a:endParaRPr lang="es-ES">
               <a:solidFill>
@@ -7630,7 +9177,7 @@
 </p:sld>
 </file>
 
-<file path=ppt/slides/slide19.xml><?xml version="1.0" encoding="utf-8"?>
+<file path=ppt/slides/slide22.xml><?xml version="1.0" encoding="utf-8"?>
 <p:sld xmlns:a="http://schemas.openxmlformats.org/drawingml/2006/main" xmlns:r="http://schemas.openxmlformats.org/officeDocument/2006/relationships" xmlns:p="http://schemas.openxmlformats.org/presentationml/2006/main">
   <p:cSld>
     <p:spTree>
@@ -7787,7 +9334,7 @@
               <a:pPr defTabSz="422041">
                 <a:defRPr/>
               </a:pPr>
-              <a:t>19</a:t>
+              <a:t>22</a:t>
             </a:fld>
             <a:endParaRPr lang="es-ES">
               <a:solidFill>
@@ -7951,7 +9498,7 @@
 </p:sld>
 </file>
 
-<file path=ppt/slides/slide2.xml><?xml version="1.0" encoding="utf-8"?>
+<file path=ppt/slides/slide23.xml><?xml version="1.0" encoding="utf-8"?>
 <p:sld xmlns:a="http://schemas.openxmlformats.org/drawingml/2006/main" xmlns:r="http://schemas.openxmlformats.org/officeDocument/2006/relationships" xmlns:p="http://schemas.openxmlformats.org/presentationml/2006/main">
   <p:cSld>
     <p:spTree>
@@ -7970,264 +9517,6 @@
       </p:grpSpPr>
       <p:sp>
         <p:nvSpPr>
-          <p:cNvPr id="2" name="Título 1"/>
-          <p:cNvSpPr>
-            <a:spLocks noGrp="1"/>
-          </p:cNvSpPr>
-          <p:nvPr>
-            <p:ph type="title"/>
-          </p:nvPr>
-        </p:nvSpPr>
-        <p:spPr/>
-        <p:txBody>
-          <a:bodyPr/>
-          <a:lstStyle/>
-          <a:p>
-            <a:r>
-              <a:rPr lang="es-ES"/>
-              <a:t>Índice de contenidos</a:t>
-            </a:r>
-          </a:p>
-        </p:txBody>
-      </p:sp>
-      <p:sp>
-        <p:nvSpPr>
-          <p:cNvPr id="3" name="Marcador de contenido 2"/>
-          <p:cNvSpPr>
-            <a:spLocks noGrp="1"/>
-          </p:cNvSpPr>
-          <p:nvPr>
-            <p:ph idx="1"/>
-          </p:nvPr>
-        </p:nvSpPr>
-        <p:spPr>
-          <a:xfrm>
-            <a:off x="628650" y="1117600"/>
-            <a:ext cx="8177022" cy="5511800"/>
-          </a:xfrm>
-        </p:spPr>
-        <p:txBody>
-          <a:bodyPr>
-            <a:normAutofit fontScale="55000" lnSpcReduction="20000"/>
-          </a:bodyPr>
-          <a:lstStyle/>
-          <a:p>
-            <a:r>
-              <a:rPr lang="es-ES"/>
-              <a:t>Introducción – El problema</a:t>
-            </a:r>
-          </a:p>
-          <a:p>
-            <a:r>
-              <a:rPr lang="es-ES"/>
-              <a:t>La solución</a:t>
-            </a:r>
-          </a:p>
-          <a:p>
-            <a:r>
-              <a:rPr lang="es-ES"/>
-              <a:t>El equipo y el trabajo en equipo</a:t>
-            </a:r>
-          </a:p>
-          <a:p>
-            <a:r>
-              <a:rPr lang="es-ES"/>
-              <a:t>Actividades de Ingeniería de Software</a:t>
-            </a:r>
-          </a:p>
-          <a:p>
-            <a:pPr lvl="1"/>
-            <a:r>
-              <a:rPr lang="es-ES"/>
-              <a:t>Requisitos</a:t>
-            </a:r>
-          </a:p>
-          <a:p>
-            <a:pPr lvl="1"/>
-            <a:r>
-              <a:rPr lang="es-ES"/>
-              <a:t>Planificación</a:t>
-            </a:r>
-          </a:p>
-          <a:p>
-            <a:pPr lvl="1"/>
-            <a:r>
-              <a:rPr lang="es-ES"/>
-              <a:t>Arquitectura</a:t>
-            </a:r>
-          </a:p>
-          <a:p>
-            <a:pPr lvl="1"/>
-            <a:r>
-              <a:rPr lang="es-ES"/>
-              <a:t>Modelos </a:t>
-            </a:r>
-          </a:p>
-          <a:p>
-            <a:pPr lvl="1"/>
-            <a:r>
-              <a:rPr lang="es-ES"/>
-              <a:t>Patrones/Principios</a:t>
-            </a:r>
-          </a:p>
-          <a:p>
-            <a:pPr lvl="1"/>
-            <a:r>
-              <a:rPr lang="es-ES"/>
-              <a:t>Pruebas</a:t>
-            </a:r>
-          </a:p>
-          <a:p>
-            <a:r>
-              <a:rPr lang="es-ES"/>
-              <a:t>Desarrollo/Despliegue</a:t>
-            </a:r>
-          </a:p>
-          <a:p>
-            <a:pPr lvl="1"/>
-            <a:r>
-              <a:rPr lang="es-ES"/>
-              <a:t>Estrategias y herramientas</a:t>
-            </a:r>
-          </a:p>
-          <a:p>
-            <a:pPr lvl="1"/>
-            <a:r>
-              <a:rPr lang="es-ES"/>
-              <a:t>Modelo de Implementación </a:t>
-            </a:r>
-          </a:p>
-          <a:p>
-            <a:pPr lvl="1"/>
-            <a:r>
-              <a:rPr lang="es-ES"/>
-              <a:t>Despliegue</a:t>
-            </a:r>
-          </a:p>
-          <a:p>
-            <a:r>
-              <a:rPr lang="es-ES"/>
-              <a:t>Resultados</a:t>
-            </a:r>
-          </a:p>
-          <a:p>
-            <a:r>
-              <a:rPr lang="es-ES"/>
-              <a:t>Conclusiones</a:t>
-            </a:r>
-          </a:p>
-        </p:txBody>
-      </p:sp>
-      <p:sp>
-        <p:nvSpPr>
-          <p:cNvPr id="6" name="Marcador de fecha 5">
-            <a:extLst>
-              <a:ext uri="{FF2B5EF4-FFF2-40B4-BE49-F238E27FC236}">
-                <a16:creationId xmlns:a16="http://schemas.microsoft.com/office/drawing/2014/main" id="{F46DF278-D0DC-4016-8CE5-ED318BE19903}"/>
-              </a:ext>
-            </a:extLst>
-          </p:cNvPr>
-          <p:cNvSpPr>
-            <a:spLocks noGrp="1"/>
-          </p:cNvSpPr>
-          <p:nvPr>
-            <p:ph type="dt" sz="half" idx="10"/>
-          </p:nvPr>
-        </p:nvSpPr>
-        <p:spPr/>
-        <p:txBody>
-          <a:bodyPr/>
-          <a:lstStyle/>
-          <a:p>
-            <a:r>
-              <a:rPr lang="es-ES"/>
-              <a:t>Curso 2021-2022</a:t>
-            </a:r>
-            <a:endParaRPr lang="en-US"/>
-          </a:p>
-        </p:txBody>
-      </p:sp>
-      <p:sp>
-        <p:nvSpPr>
-          <p:cNvPr id="4" name="Marcador de pie de página 3"/>
-          <p:cNvSpPr>
-            <a:spLocks noGrp="1"/>
-          </p:cNvSpPr>
-          <p:nvPr>
-            <p:ph type="ftr" sz="quarter" idx="11"/>
-          </p:nvPr>
-        </p:nvSpPr>
-        <p:spPr/>
-        <p:txBody>
-          <a:bodyPr/>
-          <a:lstStyle/>
-          <a:p>
-            <a:r>
-              <a:rPr lang="en-US"/>
-              <a:t>Introducción a la Ingeniería del Software</a:t>
-            </a:r>
-          </a:p>
-        </p:txBody>
-      </p:sp>
-      <p:sp>
-        <p:nvSpPr>
-          <p:cNvPr id="5" name="Marcador de número de diapositiva 4"/>
-          <p:cNvSpPr>
-            <a:spLocks noGrp="1"/>
-          </p:cNvSpPr>
-          <p:nvPr>
-            <p:ph type="sldNum" sz="quarter" idx="12"/>
-          </p:nvPr>
-        </p:nvSpPr>
-        <p:spPr/>
-        <p:txBody>
-          <a:bodyPr/>
-          <a:lstStyle/>
-          <a:p>
-            <a:fld id="{2754ED01-E2A0-4C1E-8E21-014B99041579}" type="slidenum">
-              <a:rPr lang="en-US" smtClean="0"/>
-              <a:pPr/>
-              <a:t>2</a:t>
-            </a:fld>
-            <a:endParaRPr lang="en-US"/>
-          </a:p>
-        </p:txBody>
-      </p:sp>
-    </p:spTree>
-    <p:extLst>
-      <p:ext uri="{BB962C8B-B14F-4D97-AF65-F5344CB8AC3E}">
-        <p14:creationId xmlns:p14="http://schemas.microsoft.com/office/powerpoint/2010/main" val="3365594736"/>
-      </p:ext>
-    </p:extLst>
-  </p:cSld>
-  <p:clrMapOvr>
-    <a:masterClrMapping/>
-  </p:clrMapOvr>
-  <p:transition spd="slow">
-    <p:push dir="u"/>
-  </p:transition>
-</p:sld>
-</file>
-
-<file path=ppt/slides/slide20.xml><?xml version="1.0" encoding="utf-8"?>
-<p:sld xmlns:a="http://schemas.openxmlformats.org/drawingml/2006/main" xmlns:r="http://schemas.openxmlformats.org/officeDocument/2006/relationships" xmlns:p="http://schemas.openxmlformats.org/presentationml/2006/main">
-  <p:cSld>
-    <p:spTree>
-      <p:nvGrpSpPr>
-        <p:cNvPr id="1" name=""/>
-        <p:cNvGrpSpPr/>
-        <p:nvPr/>
-      </p:nvGrpSpPr>
-      <p:grpSpPr>
-        <a:xfrm>
-          <a:off x="0" y="0"/>
-          <a:ext cx="0" cy="0"/>
-          <a:chOff x="0" y="0"/>
-          <a:chExt cx="0" cy="0"/>
-        </a:xfrm>
-      </p:grpSpPr>
-      <p:sp>
-        <p:nvSpPr>
           <p:cNvPr id="2" name="Título 1">
             <a:extLst>
               <a:ext uri="{FF2B5EF4-FFF2-40B4-BE49-F238E27FC236}">
@@ -8481,7 +9770,7 @@
               <a:pPr defTabSz="422041">
                 <a:defRPr/>
               </a:pPr>
-              <a:t>20</a:t>
+              <a:t>23</a:t>
             </a:fld>
             <a:endParaRPr lang="es-ES">
               <a:solidFill>
@@ -9594,12 +10883,12 @@
           <a:lstStyle/>
           <a:p>
             <a:r>
-              <a:rPr lang="es-ES" sz="2950">
+              <a:rPr lang="es-ES" sz="2950" dirty="0">
                 <a:latin typeface="Geneva"/>
               </a:rPr>
-              <a:t>Planificación.</a:t>
-            </a:r>
-            <a:endParaRPr lang="es-ES"/>
+              <a:t>Planificación</a:t>
+            </a:r>
+            <a:endParaRPr lang="es-ES" dirty="0"/>
           </a:p>
         </p:txBody>
       </p:sp>
@@ -9835,7 +11124,7 @@
           <p:cNvPr id="2" name="Título 1">
             <a:extLst>
               <a:ext uri="{FF2B5EF4-FFF2-40B4-BE49-F238E27FC236}">
-                <a16:creationId xmlns:a16="http://schemas.microsoft.com/office/drawing/2014/main" id="{F69FF439-ADBC-E2A8-75DD-26B866C6235E}"/>
+                <a16:creationId xmlns:a16="http://schemas.microsoft.com/office/drawing/2014/main" id="{04B46495-5D51-55E9-9CB7-C4644155D94A}"/>
               </a:ext>
             </a:extLst>
           </p:cNvPr>
@@ -9852,50 +11141,57 @@
           <a:lstStyle/>
           <a:p>
             <a:r>
-              <a:rPr lang="es-ES" sz="2950">
+              <a:rPr lang="es-ES" sz="3200" dirty="0">
                 <a:latin typeface="Geneva"/>
               </a:rPr>
-              <a:t>Arquitectura</a:t>
-            </a:r>
-            <a:endParaRPr lang="es-ES"/>
-          </a:p>
-        </p:txBody>
-      </p:sp>
-      <p:pic>
-        <p:nvPicPr>
-          <p:cNvPr id="7" name="Imagen 7" descr="Diagrama&#10;&#10;Descripción generada automáticamente">
-            <a:extLst>
-              <a:ext uri="{FF2B5EF4-FFF2-40B4-BE49-F238E27FC236}">
-                <a16:creationId xmlns:a16="http://schemas.microsoft.com/office/drawing/2014/main" id="{045DC57D-CB8C-4C99-0826-520B1A229B32}"/>
-              </a:ext>
-            </a:extLst>
-          </p:cNvPr>
-          <p:cNvPicPr>
-            <a:picLocks noGrp="1" noChangeAspect="1"/>
-          </p:cNvPicPr>
+              <a:t>Planificación</a:t>
+            </a:r>
+            <a:endParaRPr lang="es-ES" dirty="0"/>
+          </a:p>
+        </p:txBody>
+      </p:sp>
+      <p:sp>
+        <p:nvSpPr>
+          <p:cNvPr id="3" name="Marcador de contenido 2">
+            <a:extLst>
+              <a:ext uri="{FF2B5EF4-FFF2-40B4-BE49-F238E27FC236}">
+                <a16:creationId xmlns:a16="http://schemas.microsoft.com/office/drawing/2014/main" id="{E2EADCF1-77B5-835A-CD68-333739134B27}"/>
+              </a:ext>
+            </a:extLst>
+          </p:cNvPr>
+          <p:cNvSpPr>
+            <a:spLocks noGrp="1"/>
+          </p:cNvSpPr>
           <p:nvPr>
             <p:ph idx="1"/>
           </p:nvPr>
-        </p:nvPicPr>
-        <p:blipFill>
-          <a:blip r:embed="rId2"/>
-          <a:stretch>
-            <a:fillRect/>
-          </a:stretch>
-        </p:blipFill>
-        <p:spPr>
-          <a:xfrm>
-            <a:off x="1069017" y="1739654"/>
-            <a:ext cx="7389300" cy="4153842"/>
-          </a:xfrm>
-        </p:spPr>
-      </p:pic>
+        </p:nvSpPr>
+        <p:spPr/>
+        <p:txBody>
+          <a:bodyPr/>
+          <a:lstStyle/>
+          <a:p>
+            <a:r>
+              <a:rPr lang="es-ES" dirty="0"/>
+              <a:t>Planificación de tareas en Tablero Trello a través del concepto de </a:t>
+            </a:r>
+            <a:r>
+              <a:rPr lang="es-ES" i="1" dirty="0"/>
+              <a:t>sprint</a:t>
+            </a:r>
+            <a:r>
+              <a:rPr lang="es-ES" dirty="0"/>
+              <a:t>.</a:t>
+            </a:r>
+          </a:p>
+        </p:txBody>
+      </p:sp>
       <p:sp>
         <p:nvSpPr>
           <p:cNvPr id="4" name="Marcador de fecha 3">
             <a:extLst>
               <a:ext uri="{FF2B5EF4-FFF2-40B4-BE49-F238E27FC236}">
-                <a16:creationId xmlns:a16="http://schemas.microsoft.com/office/drawing/2014/main" id="{1C7F6A76-A49E-63E1-873B-974ABA7D96CF}"/>
+                <a16:creationId xmlns:a16="http://schemas.microsoft.com/office/drawing/2014/main" id="{0252129A-4E51-5805-B99F-B201D3B9383B}"/>
               </a:ext>
             </a:extLst>
           </p:cNvPr>
@@ -9932,7 +11228,7 @@
           <p:cNvPr id="5" name="Marcador de pie de página 4">
             <a:extLst>
               <a:ext uri="{FF2B5EF4-FFF2-40B4-BE49-F238E27FC236}">
-                <a16:creationId xmlns:a16="http://schemas.microsoft.com/office/drawing/2014/main" id="{B02D4C27-4DF3-360E-6F59-85946C50BBE2}"/>
+                <a16:creationId xmlns:a16="http://schemas.microsoft.com/office/drawing/2014/main" id="{E4E507FF-6B3D-F737-181A-732E19EBBBF0}"/>
               </a:ext>
             </a:extLst>
           </p:cNvPr>
@@ -9969,7 +11265,7 @@
           <p:cNvPr id="6" name="Marcador de número de diapositiva 5">
             <a:extLst>
               <a:ext uri="{FF2B5EF4-FFF2-40B4-BE49-F238E27FC236}">
-                <a16:creationId xmlns:a16="http://schemas.microsoft.com/office/drawing/2014/main" id="{F4FB0E14-3B76-E561-001A-F81574E95A75}"/>
+                <a16:creationId xmlns:a16="http://schemas.microsoft.com/office/drawing/2014/main" id="{3E579B45-4B84-1610-6651-413F2B9603FA}"/>
               </a:ext>
             </a:extLst>
           </p:cNvPr>
@@ -10011,97 +11307,133 @@
           </a:p>
         </p:txBody>
       </p:sp>
-      <p:sp>
-        <p:nvSpPr>
-          <p:cNvPr id="8" name="CuadroTexto 7">
-            <a:extLst>
-              <a:ext uri="{FF2B5EF4-FFF2-40B4-BE49-F238E27FC236}">
-                <a16:creationId xmlns:a16="http://schemas.microsoft.com/office/drawing/2014/main" id="{869C0773-BC34-3837-9693-47BDA2D12B51}"/>
-              </a:ext>
-            </a:extLst>
-          </p:cNvPr>
-          <p:cNvSpPr txBox="1"/>
+      <p:pic>
+        <p:nvPicPr>
+          <p:cNvPr id="7" name="Imagen 6" descr="Interfaz de usuario gráfica, Texto, Aplicación, Chat o mensaje de texto&#10;&#10;Descripción generada automáticamente">
+            <a:extLst>
+              <a:ext uri="{FF2B5EF4-FFF2-40B4-BE49-F238E27FC236}">
+                <a16:creationId xmlns:a16="http://schemas.microsoft.com/office/drawing/2014/main" id="{EC7A1E12-8711-68CA-D115-2B2A69ADAD3C}"/>
+              </a:ext>
+            </a:extLst>
+          </p:cNvPr>
+          <p:cNvPicPr>
+            <a:picLocks noChangeAspect="1"/>
+          </p:cNvPicPr>
           <p:nvPr/>
-        </p:nvSpPr>
+        </p:nvPicPr>
+        <p:blipFill rotWithShape="1">
+          <a:blip r:embed="rId2"/>
+          <a:srcRect l="50382"/>
+          <a:stretch/>
+        </p:blipFill>
         <p:spPr>
           <a:xfrm>
-            <a:off x="1904650" y="1304179"/>
-            <a:ext cx="5598065" cy="523220"/>
+            <a:off x="3969644" y="2562981"/>
+            <a:ext cx="4290813" cy="3713704"/>
           </a:xfrm>
           <a:prstGeom prst="rect">
             <a:avLst/>
           </a:prstGeom>
-          <a:noFill/>
+          <a:ln>
+            <a:solidFill>
+              <a:schemeClr val="accent2"/>
+            </a:solidFill>
+          </a:ln>
         </p:spPr>
-        <p:txBody>
-          <a:bodyPr rot="0" spcFirstLastPara="0" vertOverflow="overflow" horzOverflow="overflow" vert="horz" wrap="square" lIns="91440" tIns="45720" rIns="91440" bIns="45720" numCol="1" spcCol="0" rtlCol="0" fromWordArt="0" anchor="t" anchorCtr="0" forceAA="0" compatLnSpc="1">
-            <a:prstTxWarp prst="textNoShape">
-              <a:avLst/>
-            </a:prstTxWarp>
-            <a:spAutoFit/>
-          </a:bodyPr>
-          <a:lstStyle/>
-          <a:p>
-            <a:pPr algn="ctr"/>
-            <a:r>
-              <a:rPr lang="es-ES" sz="2800" b="1">
-                <a:solidFill>
-                  <a:schemeClr val="accent1">
-                    <a:lumMod val="50000"/>
-                  </a:schemeClr>
-                </a:solidFill>
-                <a:cs typeface="Calibri"/>
-              </a:rPr>
-              <a:t>MVC: Modelo-vista-controlador</a:t>
-            </a:r>
-          </a:p>
-        </p:txBody>
-      </p:sp>
-      <p:sp>
-        <p:nvSpPr>
-          <p:cNvPr id="3" name="CuadroTexto 2">
-            <a:extLst>
-              <a:ext uri="{FF2B5EF4-FFF2-40B4-BE49-F238E27FC236}">
-                <a16:creationId xmlns:a16="http://schemas.microsoft.com/office/drawing/2014/main" id="{4A28829C-2C89-6F0A-E605-F90A985885EA}"/>
-              </a:ext>
-            </a:extLst>
-          </p:cNvPr>
-          <p:cNvSpPr txBox="1"/>
+      </p:pic>
+      <p:pic>
+        <p:nvPicPr>
+          <p:cNvPr id="9" name="Imagen 8">
+            <a:extLst>
+              <a:ext uri="{FF2B5EF4-FFF2-40B4-BE49-F238E27FC236}">
+                <a16:creationId xmlns:a16="http://schemas.microsoft.com/office/drawing/2014/main" id="{0DC731A1-FA18-6E96-82E5-9DF3D017B69A}"/>
+              </a:ext>
+            </a:extLst>
+          </p:cNvPr>
+          <p:cNvPicPr>
+            <a:picLocks noChangeAspect="1"/>
+          </p:cNvPicPr>
           <p:nvPr/>
-        </p:nvSpPr>
+        </p:nvPicPr>
+        <p:blipFill>
+          <a:blip r:embed="rId3"/>
+          <a:stretch>
+            <a:fillRect/>
+          </a:stretch>
+        </p:blipFill>
         <p:spPr>
           <a:xfrm>
-            <a:off x="469725" y="5845348"/>
-            <a:ext cx="1590807" cy="375595"/>
+            <a:off x="854583" y="2562981"/>
+            <a:ext cx="2299335" cy="3713704"/>
           </a:xfrm>
           <a:prstGeom prst="rect">
             <a:avLst/>
           </a:prstGeom>
-          <a:noFill/>
+          <a:ln>
+            <a:solidFill>
+              <a:schemeClr val="accent2"/>
+            </a:solidFill>
+          </a:ln>
         </p:spPr>
-        <p:txBody>
-          <a:bodyPr wrap="square" rtlCol="0">
-            <a:spAutoFit/>
-          </a:bodyPr>
-          <a:lstStyle/>
-          <a:p>
-            <a:r>
-              <a:rPr lang="es-ES" dirty="0">
-                <a:hlinkClick r:id="rId3"/>
-              </a:rPr>
-              <a:t>AUTÓMATA</a:t>
-            </a:r>
-            <a:r>
-              <a:rPr lang="es-ES" dirty="0"/>
-              <a:t> </a:t>
-            </a:r>
+      </p:pic>
+      <p:sp>
+        <p:nvSpPr>
+          <p:cNvPr id="10" name="Flecha: a la derecha 9">
+            <a:extLst>
+              <a:ext uri="{FF2B5EF4-FFF2-40B4-BE49-F238E27FC236}">
+                <a16:creationId xmlns:a16="http://schemas.microsoft.com/office/drawing/2014/main" id="{8F1B0CC4-DCBD-5397-F6E5-5411C01E41A4}"/>
+              </a:ext>
+            </a:extLst>
+          </p:cNvPr>
+          <p:cNvSpPr/>
+          <p:nvPr/>
+        </p:nvSpPr>
+        <p:spPr>
+          <a:xfrm>
+            <a:off x="3343292" y="4215851"/>
+            <a:ext cx="436978" cy="407963"/>
+          </a:xfrm>
+          <a:prstGeom prst="rightArrow">
+            <a:avLst/>
+          </a:prstGeom>
+          <a:solidFill>
+            <a:schemeClr val="accent2"/>
+          </a:solidFill>
+          <a:ln>
+            <a:solidFill>
+              <a:schemeClr val="accent2"/>
+            </a:solidFill>
+          </a:ln>
+        </p:spPr>
+        <p:style>
+          <a:lnRef idx="2">
+            <a:schemeClr val="accent1">
+              <a:shade val="50000"/>
+            </a:schemeClr>
+          </a:lnRef>
+          <a:fillRef idx="1">
+            <a:schemeClr val="accent1"/>
+          </a:fillRef>
+          <a:effectRef idx="0">
+            <a:schemeClr val="accent1"/>
+          </a:effectRef>
+          <a:fontRef idx="minor">
+            <a:schemeClr val="lt1"/>
+          </a:fontRef>
+        </p:style>
+        <p:txBody>
+          <a:bodyPr rtlCol="0" anchor="ctr"/>
+          <a:lstStyle/>
+          <a:p>
+            <a:pPr algn="ctr"/>
+            <a:endParaRPr lang="es-ES" dirty="0"/>
           </a:p>
         </p:txBody>
       </p:sp>
     </p:spTree>
     <p:extLst>
       <p:ext uri="{BB962C8B-B14F-4D97-AF65-F5344CB8AC3E}">
-        <p14:creationId xmlns:p14="http://schemas.microsoft.com/office/powerpoint/2010/main" val="3636806485"/>
+        <p14:creationId xmlns:p14="http://schemas.microsoft.com/office/powerpoint/2010/main" val="2850129881"/>
       </p:ext>
     </p:extLst>
   </p:cSld>
@@ -10109,8 +11441,370 @@
     <a:masterClrMapping/>
   </p:clrMapOvr>
   <p:transition spd="med">
-    <p:pull/>
+    <p:wipe/>
   </p:transition>
+  <p:timing>
+    <p:tnLst>
+      <p:par>
+        <p:cTn id="1" dur="indefinite" restart="never" nodeType="tmRoot">
+          <p:childTnLst>
+            <p:seq concurrent="1" nextAc="seek">
+              <p:cTn id="2" dur="indefinite" nodeType="mainSeq">
+                <p:childTnLst>
+                  <p:par>
+                    <p:cTn id="3" fill="hold">
+                      <p:stCondLst>
+                        <p:cond delay="indefinite"/>
+                        <p:cond evt="onBegin" delay="0">
+                          <p:tn val="2"/>
+                        </p:cond>
+                      </p:stCondLst>
+                      <p:childTnLst>
+                        <p:par>
+                          <p:cTn id="4" fill="hold">
+                            <p:stCondLst>
+                              <p:cond delay="0"/>
+                            </p:stCondLst>
+                            <p:childTnLst>
+                              <p:par>
+                                <p:cTn id="5" presetID="2" presetClass="entr" presetSubtype="8" fill="hold" nodeType="afterEffect">
+                                  <p:stCondLst>
+                                    <p:cond delay="500"/>
+                                  </p:stCondLst>
+                                  <p:childTnLst>
+                                    <p:set>
+                                      <p:cBhvr>
+                                        <p:cTn id="6" dur="1" fill="hold">
+                                          <p:stCondLst>
+                                            <p:cond delay="0"/>
+                                          </p:stCondLst>
+                                        </p:cTn>
+                                        <p:tgtEl>
+                                          <p:spTgt spid="9"/>
+                                        </p:tgtEl>
+                                        <p:attrNameLst>
+                                          <p:attrName>style.visibility</p:attrName>
+                                        </p:attrNameLst>
+                                      </p:cBhvr>
+                                      <p:to>
+                                        <p:strVal val="visible"/>
+                                      </p:to>
+                                    </p:set>
+                                    <p:anim calcmode="lin" valueType="num">
+                                      <p:cBhvr additive="base">
+                                        <p:cTn id="7" dur="350" fill="hold"/>
+                                        <p:tgtEl>
+                                          <p:spTgt spid="9"/>
+                                        </p:tgtEl>
+                                        <p:attrNameLst>
+                                          <p:attrName>ppt_x</p:attrName>
+                                        </p:attrNameLst>
+                                      </p:cBhvr>
+                                      <p:tavLst>
+                                        <p:tav tm="0">
+                                          <p:val>
+                                            <p:strVal val="0-#ppt_w/2"/>
+                                          </p:val>
+                                        </p:tav>
+                                        <p:tav tm="100000">
+                                          <p:val>
+                                            <p:strVal val="#ppt_x"/>
+                                          </p:val>
+                                        </p:tav>
+                                      </p:tavLst>
+                                    </p:anim>
+                                    <p:anim calcmode="lin" valueType="num">
+                                      <p:cBhvr additive="base">
+                                        <p:cTn id="8" dur="350" fill="hold"/>
+                                        <p:tgtEl>
+                                          <p:spTgt spid="9"/>
+                                        </p:tgtEl>
+                                        <p:attrNameLst>
+                                          <p:attrName>ppt_y</p:attrName>
+                                        </p:attrNameLst>
+                                      </p:cBhvr>
+                                      <p:tavLst>
+                                        <p:tav tm="0">
+                                          <p:val>
+                                            <p:strVal val="#ppt_y"/>
+                                          </p:val>
+                                        </p:tav>
+                                        <p:tav tm="100000">
+                                          <p:val>
+                                            <p:strVal val="#ppt_y"/>
+                                          </p:val>
+                                        </p:tav>
+                                      </p:tavLst>
+                                    </p:anim>
+                                  </p:childTnLst>
+                                </p:cTn>
+                              </p:par>
+                            </p:childTnLst>
+                          </p:cTn>
+                        </p:par>
+                        <p:par>
+                          <p:cTn id="9" fill="hold">
+                            <p:stCondLst>
+                              <p:cond delay="850"/>
+                            </p:stCondLst>
+                            <p:childTnLst>
+                              <p:par>
+                                <p:cTn id="10" presetID="2" presetClass="entr" presetSubtype="8" fill="hold" grpId="0" nodeType="afterEffect">
+                                  <p:stCondLst>
+                                    <p:cond delay="500"/>
+                                  </p:stCondLst>
+                                  <p:childTnLst>
+                                    <p:set>
+                                      <p:cBhvr>
+                                        <p:cTn id="11" dur="1" fill="hold">
+                                          <p:stCondLst>
+                                            <p:cond delay="0"/>
+                                          </p:stCondLst>
+                                        </p:cTn>
+                                        <p:tgtEl>
+                                          <p:spTgt spid="10"/>
+                                        </p:tgtEl>
+                                        <p:attrNameLst>
+                                          <p:attrName>style.visibility</p:attrName>
+                                        </p:attrNameLst>
+                                      </p:cBhvr>
+                                      <p:to>
+                                        <p:strVal val="visible"/>
+                                      </p:to>
+                                    </p:set>
+                                    <p:anim calcmode="lin" valueType="num">
+                                      <p:cBhvr additive="base">
+                                        <p:cTn id="12" dur="350" fill="hold"/>
+                                        <p:tgtEl>
+                                          <p:spTgt spid="10"/>
+                                        </p:tgtEl>
+                                        <p:attrNameLst>
+                                          <p:attrName>ppt_x</p:attrName>
+                                        </p:attrNameLst>
+                                      </p:cBhvr>
+                                      <p:tavLst>
+                                        <p:tav tm="0">
+                                          <p:val>
+                                            <p:strVal val="0-#ppt_w/2"/>
+                                          </p:val>
+                                        </p:tav>
+                                        <p:tav tm="100000">
+                                          <p:val>
+                                            <p:strVal val="#ppt_x"/>
+                                          </p:val>
+                                        </p:tav>
+                                      </p:tavLst>
+                                    </p:anim>
+                                    <p:anim calcmode="lin" valueType="num">
+                                      <p:cBhvr additive="base">
+                                        <p:cTn id="13" dur="350" fill="hold"/>
+                                        <p:tgtEl>
+                                          <p:spTgt spid="10"/>
+                                        </p:tgtEl>
+                                        <p:attrNameLst>
+                                          <p:attrName>ppt_y</p:attrName>
+                                        </p:attrNameLst>
+                                      </p:cBhvr>
+                                      <p:tavLst>
+                                        <p:tav tm="0">
+                                          <p:val>
+                                            <p:strVal val="#ppt_y"/>
+                                          </p:val>
+                                        </p:tav>
+                                        <p:tav tm="100000">
+                                          <p:val>
+                                            <p:strVal val="#ppt_y"/>
+                                          </p:val>
+                                        </p:tav>
+                                      </p:tavLst>
+                                    </p:anim>
+                                  </p:childTnLst>
+                                </p:cTn>
+                              </p:par>
+                              <p:par>
+                                <p:cTn id="14" presetID="10" presetClass="entr" presetSubtype="0" fill="hold" grpId="1" nodeType="withEffect">
+                                  <p:stCondLst>
+                                    <p:cond delay="500"/>
+                                  </p:stCondLst>
+                                  <p:childTnLst>
+                                    <p:set>
+                                      <p:cBhvr>
+                                        <p:cTn id="15" dur="1" fill="hold">
+                                          <p:stCondLst>
+                                            <p:cond delay="0"/>
+                                          </p:stCondLst>
+                                        </p:cTn>
+                                        <p:tgtEl>
+                                          <p:spTgt spid="10"/>
+                                        </p:tgtEl>
+                                        <p:attrNameLst>
+                                          <p:attrName>style.visibility</p:attrName>
+                                        </p:attrNameLst>
+                                      </p:cBhvr>
+                                      <p:to>
+                                        <p:strVal val="visible"/>
+                                      </p:to>
+                                    </p:set>
+                                    <p:animEffect transition="in" filter="fade">
+                                      <p:cBhvr>
+                                        <p:cTn id="16" dur="350"/>
+                                        <p:tgtEl>
+                                          <p:spTgt spid="10"/>
+                                        </p:tgtEl>
+                                      </p:cBhvr>
+                                    </p:animEffect>
+                                  </p:childTnLst>
+                                </p:cTn>
+                              </p:par>
+                            </p:childTnLst>
+                          </p:cTn>
+                        </p:par>
+                        <p:par>
+                          <p:cTn id="17" fill="hold">
+                            <p:stCondLst>
+                              <p:cond delay="1700"/>
+                            </p:stCondLst>
+                            <p:childTnLst>
+                              <p:par>
+                                <p:cTn id="18" presetID="2" presetClass="entr" presetSubtype="8" fill="hold" nodeType="afterEffect">
+                                  <p:stCondLst>
+                                    <p:cond delay="500"/>
+                                  </p:stCondLst>
+                                  <p:childTnLst>
+                                    <p:set>
+                                      <p:cBhvr>
+                                        <p:cTn id="19" dur="1" fill="hold">
+                                          <p:stCondLst>
+                                            <p:cond delay="0"/>
+                                          </p:stCondLst>
+                                        </p:cTn>
+                                        <p:tgtEl>
+                                          <p:spTgt spid="7"/>
+                                        </p:tgtEl>
+                                        <p:attrNameLst>
+                                          <p:attrName>style.visibility</p:attrName>
+                                        </p:attrNameLst>
+                                      </p:cBhvr>
+                                      <p:to>
+                                        <p:strVal val="visible"/>
+                                      </p:to>
+                                    </p:set>
+                                    <p:anim calcmode="lin" valueType="num">
+                                      <p:cBhvr additive="base">
+                                        <p:cTn id="20" dur="350" fill="hold"/>
+                                        <p:tgtEl>
+                                          <p:spTgt spid="7"/>
+                                        </p:tgtEl>
+                                        <p:attrNameLst>
+                                          <p:attrName>ppt_x</p:attrName>
+                                        </p:attrNameLst>
+                                      </p:cBhvr>
+                                      <p:tavLst>
+                                        <p:tav tm="0">
+                                          <p:val>
+                                            <p:strVal val="0-#ppt_w/2"/>
+                                          </p:val>
+                                        </p:tav>
+                                        <p:tav tm="100000">
+                                          <p:val>
+                                            <p:strVal val="#ppt_x"/>
+                                          </p:val>
+                                        </p:tav>
+                                      </p:tavLst>
+                                    </p:anim>
+                                    <p:anim calcmode="lin" valueType="num">
+                                      <p:cBhvr additive="base">
+                                        <p:cTn id="21" dur="350" fill="hold"/>
+                                        <p:tgtEl>
+                                          <p:spTgt spid="7"/>
+                                        </p:tgtEl>
+                                        <p:attrNameLst>
+                                          <p:attrName>ppt_y</p:attrName>
+                                        </p:attrNameLst>
+                                      </p:cBhvr>
+                                      <p:tavLst>
+                                        <p:tav tm="0">
+                                          <p:val>
+                                            <p:strVal val="#ppt_y"/>
+                                          </p:val>
+                                        </p:tav>
+                                        <p:tav tm="100000">
+                                          <p:val>
+                                            <p:strVal val="#ppt_y"/>
+                                          </p:val>
+                                        </p:tav>
+                                      </p:tavLst>
+                                    </p:anim>
+                                  </p:childTnLst>
+                                </p:cTn>
+                              </p:par>
+                              <p:par>
+                                <p:cTn id="22" presetID="10" presetClass="entr" presetSubtype="0" fill="hold" nodeType="withEffect">
+                                  <p:stCondLst>
+                                    <p:cond delay="500"/>
+                                  </p:stCondLst>
+                                  <p:childTnLst>
+                                    <p:set>
+                                      <p:cBhvr>
+                                        <p:cTn id="23" dur="1" fill="hold">
+                                          <p:stCondLst>
+                                            <p:cond delay="0"/>
+                                          </p:stCondLst>
+                                        </p:cTn>
+                                        <p:tgtEl>
+                                          <p:spTgt spid="7"/>
+                                        </p:tgtEl>
+                                        <p:attrNameLst>
+                                          <p:attrName>style.visibility</p:attrName>
+                                        </p:attrNameLst>
+                                      </p:cBhvr>
+                                      <p:to>
+                                        <p:strVal val="visible"/>
+                                      </p:to>
+                                    </p:set>
+                                    <p:animEffect transition="in" filter="fade">
+                                      <p:cBhvr>
+                                        <p:cTn id="24" dur="350"/>
+                                        <p:tgtEl>
+                                          <p:spTgt spid="7"/>
+                                        </p:tgtEl>
+                                      </p:cBhvr>
+                                    </p:animEffect>
+                                  </p:childTnLst>
+                                </p:cTn>
+                              </p:par>
+                            </p:childTnLst>
+                          </p:cTn>
+                        </p:par>
+                      </p:childTnLst>
+                    </p:cTn>
+                  </p:par>
+                </p:childTnLst>
+              </p:cTn>
+              <p:prevCondLst>
+                <p:cond evt="onPrev" delay="0">
+                  <p:tgtEl>
+                    <p:sldTgt/>
+                  </p:tgtEl>
+                </p:cond>
+              </p:prevCondLst>
+              <p:nextCondLst>
+                <p:cond evt="onNext" delay="0">
+                  <p:tgtEl>
+                    <p:sldTgt/>
+                  </p:tgtEl>
+                </p:cond>
+              </p:nextCondLst>
+            </p:seq>
+          </p:childTnLst>
+        </p:cTn>
+      </p:par>
+    </p:tnLst>
+    <p:bldLst>
+      <p:bldP spid="10" grpId="0" animBg="1"/>
+      <p:bldP spid="10" grpId="1" animBg="1"/>
+    </p:bldLst>
+  </p:timing>
 </p:sld>
 </file>
 
@@ -10136,7 +11830,7 @@
           <p:cNvPr id="2" name="Título 1">
             <a:extLst>
               <a:ext uri="{FF2B5EF4-FFF2-40B4-BE49-F238E27FC236}">
-                <a16:creationId xmlns:a16="http://schemas.microsoft.com/office/drawing/2014/main" id="{06B4040A-B532-101C-06D2-E433575FEA12}"/>
+                <a16:creationId xmlns:a16="http://schemas.microsoft.com/office/drawing/2014/main" id="{04B46495-5D51-55E9-9CB7-C4644155D94A}"/>
               </a:ext>
             </a:extLst>
           </p:cNvPr>
@@ -10153,12 +11847,12 @@
           <a:lstStyle/>
           <a:p>
             <a:r>
-              <a:rPr lang="es-ES" sz="2950">
+              <a:rPr lang="es-ES" sz="3200" dirty="0">
                 <a:latin typeface="Geneva"/>
               </a:rPr>
-              <a:t>Modelos</a:t>
-            </a:r>
-            <a:endParaRPr lang="es-ES" sz="2950"/>
+              <a:t>Planificación</a:t>
+            </a:r>
+            <a:endParaRPr lang="es-ES" dirty="0"/>
           </a:p>
         </p:txBody>
       </p:sp>
@@ -10167,7 +11861,7 @@
           <p:cNvPr id="3" name="Marcador de contenido 2">
             <a:extLst>
               <a:ext uri="{FF2B5EF4-FFF2-40B4-BE49-F238E27FC236}">
-                <a16:creationId xmlns:a16="http://schemas.microsoft.com/office/drawing/2014/main" id="{249AF41E-3847-E031-C574-A321E770A3C4}"/>
+                <a16:creationId xmlns:a16="http://schemas.microsoft.com/office/drawing/2014/main" id="{E2EADCF1-77B5-835A-CD68-333739134B27}"/>
               </a:ext>
             </a:extLst>
           </p:cNvPr>
@@ -10180,20 +11874,26 @@
         </p:nvSpPr>
         <p:spPr>
           <a:xfrm>
-            <a:off x="660255" y="1430205"/>
-            <a:ext cx="7897234" cy="4730600"/>
+            <a:off x="628651" y="1503947"/>
+            <a:ext cx="7886700" cy="1194302"/>
           </a:xfrm>
         </p:spPr>
         <p:txBody>
-          <a:bodyPr vert="horz" lIns="91440" tIns="45720" rIns="91440" bIns="45720" rtlCol="0" anchor="t">
-            <a:noAutofit/>
-          </a:bodyPr>
-          <a:lstStyle/>
-          <a:p>
-            <a:pPr marL="0" indent="0" algn="ctr">
-              <a:buNone/>
-            </a:pPr>
-            <a:endParaRPr lang="es-ES" sz="3600"/>
+          <a:bodyPr/>
+          <a:lstStyle/>
+          <a:p>
+            <a:r>
+              <a:rPr lang="es-ES" dirty="0"/>
+              <a:t>Planificación de tareas en Tablero Trello a través del concepto de </a:t>
+            </a:r>
+            <a:r>
+              <a:rPr lang="es-ES" i="1" dirty="0"/>
+              <a:t>sprint</a:t>
+            </a:r>
+            <a:r>
+              <a:rPr lang="es-ES" dirty="0"/>
+              <a:t>.</a:t>
+            </a:r>
           </a:p>
         </p:txBody>
       </p:sp>
@@ -10202,7 +11902,7 @@
           <p:cNvPr id="4" name="Marcador de fecha 3">
             <a:extLst>
               <a:ext uri="{FF2B5EF4-FFF2-40B4-BE49-F238E27FC236}">
-                <a16:creationId xmlns:a16="http://schemas.microsoft.com/office/drawing/2014/main" id="{1CE2F660-9A10-8F85-498A-F308016B7DEA}"/>
+                <a16:creationId xmlns:a16="http://schemas.microsoft.com/office/drawing/2014/main" id="{0252129A-4E51-5805-B99F-B201D3B9383B}"/>
               </a:ext>
             </a:extLst>
           </p:cNvPr>
@@ -10239,7 +11939,7 @@
           <p:cNvPr id="5" name="Marcador de pie de página 4">
             <a:extLst>
               <a:ext uri="{FF2B5EF4-FFF2-40B4-BE49-F238E27FC236}">
-                <a16:creationId xmlns:a16="http://schemas.microsoft.com/office/drawing/2014/main" id="{5EADE792-0AFB-5272-59A1-C260F22570E8}"/>
+                <a16:creationId xmlns:a16="http://schemas.microsoft.com/office/drawing/2014/main" id="{E4E507FF-6B3D-F737-181A-732E19EBBBF0}"/>
               </a:ext>
             </a:extLst>
           </p:cNvPr>
@@ -10276,7 +11976,7 @@
           <p:cNvPr id="6" name="Marcador de número de diapositiva 5">
             <a:extLst>
               <a:ext uri="{FF2B5EF4-FFF2-40B4-BE49-F238E27FC236}">
-                <a16:creationId xmlns:a16="http://schemas.microsoft.com/office/drawing/2014/main" id="{ACEAFB86-E3DC-0881-5E73-F8C28677AED0}"/>
+                <a16:creationId xmlns:a16="http://schemas.microsoft.com/office/drawing/2014/main" id="{3E579B45-4B84-1610-6651-413F2B9603FA}"/>
               </a:ext>
             </a:extLst>
           </p:cNvPr>
@@ -10320,10 +12020,10 @@
       </p:sp>
       <p:pic>
         <p:nvPicPr>
-          <p:cNvPr id="10" name="Imagen 9">
-            <a:extLst>
-              <a:ext uri="{FF2B5EF4-FFF2-40B4-BE49-F238E27FC236}">
-                <a16:creationId xmlns:a16="http://schemas.microsoft.com/office/drawing/2014/main" id="{E78671A5-C72E-D736-8F93-0AB072E93C20}"/>
+          <p:cNvPr id="9" name="Imagen 8">
+            <a:extLst>
+              <a:ext uri="{FF2B5EF4-FFF2-40B4-BE49-F238E27FC236}">
+                <a16:creationId xmlns:a16="http://schemas.microsoft.com/office/drawing/2014/main" id="{4E2B2CE6-B54F-D4B9-0E9D-2B909C27C851}"/>
               </a:ext>
             </a:extLst>
           </p:cNvPr>
@@ -10333,46 +12033,310 @@
           <p:nvPr/>
         </p:nvPicPr>
         <p:blipFill>
-          <a:blip r:embed="rId2" cstate="email">
-            <a:extLst>
-              <a:ext uri="{28A0092B-C50C-407E-A947-70E740481C1C}">
-                <a14:useLocalDpi xmlns:a14="http://schemas.microsoft.com/office/drawing/2010/main" val="0"/>
-              </a:ext>
-            </a:extLst>
-          </a:blip>
+          <a:blip r:embed="rId2"/>
           <a:stretch>
             <a:fillRect/>
           </a:stretch>
         </p:blipFill>
         <p:spPr>
           <a:xfrm>
-            <a:off x="173935" y="1349345"/>
-            <a:ext cx="8796130" cy="5090893"/>
+            <a:off x="942652" y="3955808"/>
+            <a:ext cx="2291785" cy="1572795"/>
+          </a:xfrm>
+          <a:prstGeom prst="rect">
+            <a:avLst/>
+          </a:prstGeom>
+          <a:ln>
+            <a:solidFill>
+              <a:schemeClr val="accent2"/>
+            </a:solidFill>
+          </a:ln>
+        </p:spPr>
+        <p:style>
+          <a:lnRef idx="2">
+            <a:schemeClr val="accent4">
+              <a:shade val="50000"/>
+            </a:schemeClr>
+          </a:lnRef>
+          <a:fillRef idx="1">
+            <a:schemeClr val="accent4"/>
+          </a:fillRef>
+          <a:effectRef idx="0">
+            <a:schemeClr val="accent4"/>
+          </a:effectRef>
+          <a:fontRef idx="minor">
+            <a:schemeClr val="lt1"/>
+          </a:fontRef>
+        </p:style>
+      </p:pic>
+      <p:pic>
+        <p:nvPicPr>
+          <p:cNvPr id="11" name="Imagen 10" descr="Interfaz de usuario gráfica, Texto, Aplicación&#10;&#10;Descripción generada automáticamente">
+            <a:extLst>
+              <a:ext uri="{FF2B5EF4-FFF2-40B4-BE49-F238E27FC236}">
+                <a16:creationId xmlns:a16="http://schemas.microsoft.com/office/drawing/2014/main" id="{E1AEB45B-D9D0-F155-72C5-EE5E593138D4}"/>
+              </a:ext>
+            </a:extLst>
+          </p:cNvPr>
+          <p:cNvPicPr>
+            <a:picLocks noChangeAspect="1"/>
+          </p:cNvPicPr>
+          <p:nvPr/>
+        </p:nvPicPr>
+        <p:blipFill>
+          <a:blip r:embed="rId3"/>
+          <a:stretch>
+            <a:fillRect/>
+          </a:stretch>
+        </p:blipFill>
+        <p:spPr>
+          <a:xfrm>
+            <a:off x="3546689" y="3646319"/>
+            <a:ext cx="4968660" cy="2110477"/>
+          </a:xfrm>
+          <a:prstGeom prst="rect">
+            <a:avLst/>
+          </a:prstGeom>
+          <a:ln>
+            <a:solidFill>
+              <a:schemeClr val="accent2"/>
+            </a:solidFill>
+          </a:ln>
+        </p:spPr>
+      </p:pic>
+      <p:sp>
+        <p:nvSpPr>
+          <p:cNvPr id="12" name="Marcador de contenido 2">
+            <a:extLst>
+              <a:ext uri="{FF2B5EF4-FFF2-40B4-BE49-F238E27FC236}">
+                <a16:creationId xmlns:a16="http://schemas.microsoft.com/office/drawing/2014/main" id="{29ABE0C3-1CD9-EEE2-F075-7F695520B0AE}"/>
+              </a:ext>
+            </a:extLst>
+          </p:cNvPr>
+          <p:cNvSpPr txBox="1">
+            <a:spLocks/>
+          </p:cNvSpPr>
+          <p:nvPr/>
+        </p:nvSpPr>
+        <p:spPr>
+          <a:xfrm>
+            <a:off x="628649" y="2461037"/>
+            <a:ext cx="7886700" cy="1194302"/>
           </a:xfrm>
           <a:prstGeom prst="rect">
             <a:avLst/>
           </a:prstGeom>
         </p:spPr>
-      </p:pic>
+        <p:txBody>
+          <a:bodyPr vert="horz" lIns="91440" tIns="45720" rIns="91440" bIns="45720" rtlCol="0">
+            <a:normAutofit/>
+          </a:bodyPr>
+          <a:lstStyle>
+            <a:lvl1pPr marL="211021" indent="-211021" algn="l" defTabSz="844083" rtl="0" eaLnBrk="1" latinLnBrk="0" hangingPunct="1">
+              <a:lnSpc>
+                <a:spcPct val="100000"/>
+              </a:lnSpc>
+              <a:spcBef>
+                <a:spcPts val="554"/>
+              </a:spcBef>
+              <a:spcAft>
+                <a:spcPts val="554"/>
+              </a:spcAft>
+              <a:buFont typeface="Arial" panose="020B0604020202020204" pitchFamily="34" charset="0"/>
+              <a:buChar char="•"/>
+              <a:defRPr sz="2954" kern="1200">
+                <a:solidFill>
+                  <a:schemeClr val="tx1"/>
+                </a:solidFill>
+                <a:latin typeface="Helvetica" pitchFamily="2" charset="0"/>
+                <a:ea typeface="Verdana" panose="020B0604030504040204" pitchFamily="34" charset="0"/>
+                <a:cs typeface="Arial" panose="020B0604020202020204" pitchFamily="34" charset="0"/>
+              </a:defRPr>
+            </a:lvl1pPr>
+            <a:lvl2pPr marL="633062" indent="-211021" algn="l" defTabSz="844083" rtl="0" eaLnBrk="1" latinLnBrk="0" hangingPunct="1">
+              <a:lnSpc>
+                <a:spcPct val="100000"/>
+              </a:lnSpc>
+              <a:spcBef>
+                <a:spcPts val="554"/>
+              </a:spcBef>
+              <a:spcAft>
+                <a:spcPts val="554"/>
+              </a:spcAft>
+              <a:buFont typeface="Arial" panose="020B0604020202020204" pitchFamily="34" charset="0"/>
+              <a:buChar char="•"/>
+              <a:defRPr sz="2585" kern="1200">
+                <a:solidFill>
+                  <a:schemeClr val="tx1"/>
+                </a:solidFill>
+                <a:latin typeface="Helvetica" pitchFamily="2" charset="0"/>
+                <a:ea typeface="Verdana" panose="020B0604030504040204" pitchFamily="34" charset="0"/>
+                <a:cs typeface="Arial" panose="020B0604020202020204" pitchFamily="34" charset="0"/>
+              </a:defRPr>
+            </a:lvl2pPr>
+            <a:lvl3pPr marL="1055103" indent="-211021" algn="l" defTabSz="844083" rtl="0" eaLnBrk="1" latinLnBrk="0" hangingPunct="1">
+              <a:lnSpc>
+                <a:spcPct val="100000"/>
+              </a:lnSpc>
+              <a:spcBef>
+                <a:spcPts val="554"/>
+              </a:spcBef>
+              <a:spcAft>
+                <a:spcPts val="554"/>
+              </a:spcAft>
+              <a:buFont typeface="Arial" panose="020B0604020202020204" pitchFamily="34" charset="0"/>
+              <a:buChar char="•"/>
+              <a:defRPr sz="2215" kern="1200">
+                <a:solidFill>
+                  <a:schemeClr val="tx1"/>
+                </a:solidFill>
+                <a:latin typeface="Helvetica" pitchFamily="2" charset="0"/>
+                <a:ea typeface="Verdana" panose="020B0604030504040204" pitchFamily="34" charset="0"/>
+                <a:cs typeface="Arial" panose="020B0604020202020204" pitchFamily="34" charset="0"/>
+              </a:defRPr>
+            </a:lvl3pPr>
+            <a:lvl4pPr marL="1477145" indent="-211021" algn="l" defTabSz="844083" rtl="0" eaLnBrk="1" latinLnBrk="0" hangingPunct="1">
+              <a:lnSpc>
+                <a:spcPct val="100000"/>
+              </a:lnSpc>
+              <a:spcBef>
+                <a:spcPts val="554"/>
+              </a:spcBef>
+              <a:spcAft>
+                <a:spcPts val="554"/>
+              </a:spcAft>
+              <a:buFont typeface="Arial" panose="020B0604020202020204" pitchFamily="34" charset="0"/>
+              <a:buChar char="•"/>
+              <a:defRPr sz="1846" kern="1200">
+                <a:solidFill>
+                  <a:schemeClr val="tx1"/>
+                </a:solidFill>
+                <a:latin typeface="Helvetica" pitchFamily="2" charset="0"/>
+                <a:ea typeface="Verdana" panose="020B0604030504040204" pitchFamily="34" charset="0"/>
+                <a:cs typeface="Arial" panose="020B0604020202020204" pitchFamily="34" charset="0"/>
+              </a:defRPr>
+            </a:lvl4pPr>
+            <a:lvl5pPr marL="1899186" indent="-211021" algn="l" defTabSz="844083" rtl="0" eaLnBrk="1" latinLnBrk="0" hangingPunct="1">
+              <a:lnSpc>
+                <a:spcPct val="100000"/>
+              </a:lnSpc>
+              <a:spcBef>
+                <a:spcPts val="554"/>
+              </a:spcBef>
+              <a:spcAft>
+                <a:spcPts val="554"/>
+              </a:spcAft>
+              <a:buFont typeface="Arial" panose="020B0604020202020204" pitchFamily="34" charset="0"/>
+              <a:buChar char="•"/>
+              <a:defRPr sz="1846" kern="1200">
+                <a:solidFill>
+                  <a:schemeClr val="tx1"/>
+                </a:solidFill>
+                <a:latin typeface="Helvetica" pitchFamily="2" charset="0"/>
+                <a:ea typeface="Verdana" panose="020B0604030504040204" pitchFamily="34" charset="0"/>
+                <a:cs typeface="Arial" panose="020B0604020202020204" pitchFamily="34" charset="0"/>
+              </a:defRPr>
+            </a:lvl5pPr>
+            <a:lvl6pPr marL="2321227" indent="-211021" algn="l" defTabSz="844083" rtl="0" eaLnBrk="1" latinLnBrk="0" hangingPunct="1">
+              <a:lnSpc>
+                <a:spcPct val="90000"/>
+              </a:lnSpc>
+              <a:spcBef>
+                <a:spcPts val="462"/>
+              </a:spcBef>
+              <a:buFont typeface="Arial" panose="020B0604020202020204" pitchFamily="34" charset="0"/>
+              <a:buChar char="•"/>
+              <a:defRPr sz="1662" kern="1200">
+                <a:solidFill>
+                  <a:schemeClr val="tx1"/>
+                </a:solidFill>
+                <a:latin typeface="+mn-lt"/>
+                <a:ea typeface="+mn-ea"/>
+                <a:cs typeface="+mn-cs"/>
+              </a:defRPr>
+            </a:lvl6pPr>
+            <a:lvl7pPr marL="2743269" indent="-211021" algn="l" defTabSz="844083" rtl="0" eaLnBrk="1" latinLnBrk="0" hangingPunct="1">
+              <a:lnSpc>
+                <a:spcPct val="90000"/>
+              </a:lnSpc>
+              <a:spcBef>
+                <a:spcPts val="462"/>
+              </a:spcBef>
+              <a:buFont typeface="Arial" panose="020B0604020202020204" pitchFamily="34" charset="0"/>
+              <a:buChar char="•"/>
+              <a:defRPr sz="1662" kern="1200">
+                <a:solidFill>
+                  <a:schemeClr val="tx1"/>
+                </a:solidFill>
+                <a:latin typeface="+mn-lt"/>
+                <a:ea typeface="+mn-ea"/>
+                <a:cs typeface="+mn-cs"/>
+              </a:defRPr>
+            </a:lvl7pPr>
+            <a:lvl8pPr marL="3165310" indent="-211021" algn="l" defTabSz="844083" rtl="0" eaLnBrk="1" latinLnBrk="0" hangingPunct="1">
+              <a:lnSpc>
+                <a:spcPct val="90000"/>
+              </a:lnSpc>
+              <a:spcBef>
+                <a:spcPts val="462"/>
+              </a:spcBef>
+              <a:buFont typeface="Arial" panose="020B0604020202020204" pitchFamily="34" charset="0"/>
+              <a:buChar char="•"/>
+              <a:defRPr sz="1662" kern="1200">
+                <a:solidFill>
+                  <a:schemeClr val="tx1"/>
+                </a:solidFill>
+                <a:latin typeface="+mn-lt"/>
+                <a:ea typeface="+mn-ea"/>
+                <a:cs typeface="+mn-cs"/>
+              </a:defRPr>
+            </a:lvl8pPr>
+            <a:lvl9pPr marL="3587351" indent="-211021" algn="l" defTabSz="844083" rtl="0" eaLnBrk="1" latinLnBrk="0" hangingPunct="1">
+              <a:lnSpc>
+                <a:spcPct val="90000"/>
+              </a:lnSpc>
+              <a:spcBef>
+                <a:spcPts val="462"/>
+              </a:spcBef>
+              <a:buFont typeface="Arial" panose="020B0604020202020204" pitchFamily="34" charset="0"/>
+              <a:buChar char="•"/>
+              <a:defRPr sz="1662" kern="1200">
+                <a:solidFill>
+                  <a:schemeClr val="tx1"/>
+                </a:solidFill>
+                <a:latin typeface="+mn-lt"/>
+                <a:ea typeface="+mn-ea"/>
+                <a:cs typeface="+mn-cs"/>
+              </a:defRPr>
+            </a:lvl9pPr>
+          </a:lstStyle>
+          <a:p>
+            <a:r>
+              <a:rPr lang="es-ES" dirty="0"/>
+              <a:t>Creación de reglas y botones para agilizar la organización (Butler).</a:t>
+            </a:r>
+          </a:p>
+        </p:txBody>
+      </p:sp>
     </p:spTree>
     <p:extLst>
       <p:ext uri="{BB962C8B-B14F-4D97-AF65-F5344CB8AC3E}">
-        <p14:creationId xmlns:p14="http://schemas.microsoft.com/office/powerpoint/2010/main" val="3841751223"/>
+        <p14:creationId xmlns:p14="http://schemas.microsoft.com/office/powerpoint/2010/main" val="3090432756"/>
       </p:ext>
     </p:extLst>
   </p:cSld>
   <p:clrMapOvr>
     <a:masterClrMapping/>
   </p:clrMapOvr>
-  <mc:AlternateContent xmlns:mc="http://schemas.openxmlformats.org/markup-compatibility/2006" xmlns:p14="http://schemas.microsoft.com/office/powerpoint/2010/main">
-    <mc:Choice Requires="p14">
-      <p:transition spd="slow" p14:dur="800">
-        <p:circle/>
+  <mc:AlternateContent xmlns:mc="http://schemas.openxmlformats.org/markup-compatibility/2006">
+    <mc:Choice xmlns:p159="http://schemas.microsoft.com/office/powerpoint/2015/09/main" Requires="p159">
+      <p:transition spd="slow">
+        <p159:morph option="byObject"/>
       </p:transition>
     </mc:Choice>
-    <mc:Fallback xmlns="">
+    <mc:Fallback>
       <p:transition spd="slow">
-        <p:circle/>
+        <p:fade/>
       </p:transition>
     </mc:Fallback>
   </mc:AlternateContent>

</xml_diff>